<commit_message>
add a couple slides
</commit_message>
<xml_diff>
--- a/Week 5/Lecture/2D spatial models.pptx
+++ b/Week 5/Lecture/2D spatial models.pptx
@@ -5,7 +5,7 @@
     <p:sldMasterId id="2147483672" r:id="rId1"/>
   </p:sldMasterIdLst>
   <p:notesMasterIdLst>
-    <p:notesMasterId r:id="rId23"/>
+    <p:notesMasterId r:id="rId25"/>
   </p:notesMasterIdLst>
   <p:sldIdLst>
     <p:sldId id="266" r:id="rId2"/>
@@ -22,13 +22,15 @@
     <p:sldId id="327" r:id="rId13"/>
     <p:sldId id="341" r:id="rId14"/>
     <p:sldId id="338" r:id="rId15"/>
-    <p:sldId id="276" r:id="rId16"/>
-    <p:sldId id="280" r:id="rId17"/>
-    <p:sldId id="277" r:id="rId18"/>
-    <p:sldId id="278" r:id="rId19"/>
-    <p:sldId id="279" r:id="rId20"/>
-    <p:sldId id="273" r:id="rId21"/>
-    <p:sldId id="275" r:id="rId22"/>
+    <p:sldId id="342" r:id="rId16"/>
+    <p:sldId id="276" r:id="rId17"/>
+    <p:sldId id="280" r:id="rId18"/>
+    <p:sldId id="277" r:id="rId19"/>
+    <p:sldId id="343" r:id="rId20"/>
+    <p:sldId id="278" r:id="rId21"/>
+    <p:sldId id="279" r:id="rId22"/>
+    <p:sldId id="273" r:id="rId23"/>
+    <p:sldId id="275" r:id="rId24"/>
   </p:sldIdLst>
   <p:sldSz cx="9144000" cy="6858000" type="screen4x3"/>
   <p:notesSz cx="6858000" cy="9144000"/>
@@ -217,7 +219,7 @@
           <a:p>
             <a:fld id="{1522831B-4FE3-4D45-950B-0D2C6BB2DD76}" type="datetimeFigureOut">
               <a:rPr lang="en-US" smtClean="0"/>
-              <a:t>4/18/2024</a:t>
+              <a:t>4/26/2024</a:t>
             </a:fld>
             <a:endParaRPr lang="en-US"/>
           </a:p>
@@ -3485,8 +3487,8 @@
           </a:p>
         </p:txBody>
       </p:sp>
-      <mc:AlternateContent xmlns:mc="http://schemas.openxmlformats.org/markup-compatibility/2006">
-        <mc:Choice xmlns:a14="http://schemas.microsoft.com/office/drawing/2010/main" Requires="a14">
+      <mc:AlternateContent xmlns:mc="http://schemas.openxmlformats.org/markup-compatibility/2006" xmlns:a14="http://schemas.microsoft.com/office/drawing/2010/main">
+        <mc:Choice Requires="a14">
           <p:sp>
             <p:nvSpPr>
               <p:cNvPr id="3" name="Content Placeholder 2"/>
@@ -3983,7 +3985,7 @@
             </p:txBody>
           </p:sp>
         </mc:Choice>
-        <mc:Fallback>
+        <mc:Fallback xmlns="">
           <p:sp>
             <p:nvSpPr>
               <p:cNvPr id="3" name="Content Placeholder 2"/>
@@ -4070,8 +4072,8 @@
           </a:p>
         </p:txBody>
       </p:sp>
-      <mc:AlternateContent xmlns:mc="http://schemas.openxmlformats.org/markup-compatibility/2006">
-        <mc:Choice xmlns:a14="http://schemas.microsoft.com/office/drawing/2010/main" Requires="a14">
+      <mc:AlternateContent xmlns:mc="http://schemas.openxmlformats.org/markup-compatibility/2006" xmlns:a14="http://schemas.microsoft.com/office/drawing/2010/main">
+        <mc:Choice Requires="a14">
           <p:sp>
             <p:nvSpPr>
               <p:cNvPr id="3" name="Content Placeholder 2"/>
@@ -5872,7 +5874,7 @@
             </p:txBody>
           </p:sp>
         </mc:Choice>
-        <mc:Fallback>
+        <mc:Fallback xmlns="">
           <p:sp>
             <p:nvSpPr>
               <p:cNvPr id="3" name="Content Placeholder 2"/>
@@ -6736,8 +6738,8 @@
           </a:p>
         </p:txBody>
       </p:sp>
-      <mc:AlternateContent xmlns:mc="http://schemas.openxmlformats.org/markup-compatibility/2006">
-        <mc:Choice xmlns:a14="http://schemas.microsoft.com/office/drawing/2010/main" Requires="a14">
+      <mc:AlternateContent xmlns:mc="http://schemas.openxmlformats.org/markup-compatibility/2006" xmlns:a14="http://schemas.microsoft.com/office/drawing/2010/main">
+        <mc:Choice Requires="a14">
           <p:sp>
             <p:nvSpPr>
               <p:cNvPr id="3" name="Content Placeholder 2"/>
@@ -6773,7 +6775,7 @@
                       <m:sSub>
                         <m:sSubPr>
                           <m:ctrlPr>
-                            <a:rPr lang="en-US" b="1" i="0" smtClean="0">
+                            <a:rPr lang="en-US" b="1" i="1" smtClean="0">
                               <a:latin typeface="Cambria Math" panose="02040503050406030204" pitchFamily="18" charset="0"/>
                               <a:ea typeface="Cambria Math" panose="02040503050406030204" pitchFamily="18" charset="0"/>
                             </a:rPr>
@@ -7549,7 +7551,13 @@
                                   <a:rPr lang="en-US" b="0" i="1" smtClean="0">
                                     <a:latin typeface="Cambria Math" panose="02040503050406030204" pitchFamily="18" charset="0"/>
                                   </a:rPr>
-                                  <m:t>(1+</m:t>
+                                  <m:t>(</m:t>
+                                </m:r>
+                                <m:r>
+                                  <a:rPr lang="en-US" b="0" i="1" smtClean="0">
+                                    <a:latin typeface="Cambria Math" panose="02040503050406030204" pitchFamily="18" charset="0"/>
+                                  </a:rPr>
+                                  <m:t>1+</m:t>
                                 </m:r>
                                 <m:sSup>
                                   <m:sSupPr>
@@ -9879,7 +9887,7 @@
             </p:txBody>
           </p:sp>
         </mc:Choice>
-        <mc:Fallback>
+        <mc:Fallback xmlns="">
           <p:sp>
             <p:nvSpPr>
               <p:cNvPr id="3" name="Content Placeholder 2"/>
@@ -10663,6 +10671,66 @@
           <a:chExt cx="0" cy="0"/>
         </a:xfrm>
       </p:grpSpPr>
+      <p:pic>
+        <p:nvPicPr>
+          <p:cNvPr id="4" name="Picture 3">
+            <a:extLst>
+              <a:ext uri="{FF2B5EF4-FFF2-40B4-BE49-F238E27FC236}">
+                <a16:creationId xmlns:a16="http://schemas.microsoft.com/office/drawing/2014/main" id="{D2F1150D-C46B-421E-8A13-DAC2DAD2F665}"/>
+              </a:ext>
+            </a:extLst>
+          </p:cNvPr>
+          <p:cNvPicPr>
+            <a:picLocks noChangeAspect="1"/>
+          </p:cNvPicPr>
+          <p:nvPr/>
+        </p:nvPicPr>
+        <p:blipFill>
+          <a:blip r:embed="rId2"/>
+          <a:stretch>
+            <a:fillRect/>
+          </a:stretch>
+        </p:blipFill>
+        <p:spPr>
+          <a:xfrm>
+            <a:off x="450872" y="0"/>
+            <a:ext cx="8242256" cy="6858000"/>
+          </a:xfrm>
+          <a:prstGeom prst="rect">
+            <a:avLst/>
+          </a:prstGeom>
+        </p:spPr>
+      </p:pic>
+    </p:spTree>
+    <p:extLst>
+      <p:ext uri="{BB962C8B-B14F-4D97-AF65-F5344CB8AC3E}">
+        <p14:creationId xmlns:p14="http://schemas.microsoft.com/office/powerpoint/2010/main" val="1759162041"/>
+      </p:ext>
+    </p:extLst>
+  </p:cSld>
+  <p:clrMapOvr>
+    <a:masterClrMapping/>
+  </p:clrMapOvr>
+</p:sld>
+</file>
+
+<file path=ppt/slides/slide16.xml><?xml version="1.0" encoding="utf-8"?>
+<p:sld xmlns:a="http://schemas.openxmlformats.org/drawingml/2006/main" xmlns:r="http://schemas.openxmlformats.org/officeDocument/2006/relationships" xmlns:p="http://schemas.openxmlformats.org/presentationml/2006/main">
+  <p:cSld>
+    <p:spTree>
+      <p:nvGrpSpPr>
+        <p:cNvPr id="1" name=""/>
+        <p:cNvGrpSpPr/>
+        <p:nvPr/>
+      </p:nvGrpSpPr>
+      <p:grpSpPr>
+        <a:xfrm>
+          <a:off x="0" y="0"/>
+          <a:ext cx="0" cy="0"/>
+          <a:chOff x="0" y="0"/>
+          <a:chExt cx="0" cy="0"/>
+        </a:xfrm>
+      </p:grpSpPr>
       <p:sp>
         <p:nvSpPr>
           <p:cNvPr id="2" name="Title 1"/>
@@ -10848,7 +10916,7 @@
 </p:sld>
 </file>
 
-<file path=ppt/slides/slide16.xml><?xml version="1.0" encoding="utf-8"?>
+<file path=ppt/slides/slide17.xml><?xml version="1.0" encoding="utf-8"?>
 <p:sld xmlns:a="http://schemas.openxmlformats.org/drawingml/2006/main" xmlns:r="http://schemas.openxmlformats.org/officeDocument/2006/relationships" xmlns:p="http://schemas.openxmlformats.org/presentationml/2006/main">
   <p:cSld>
     <p:spTree>
@@ -11095,7 +11163,7 @@
 </p:sld>
 </file>
 
-<file path=ppt/slides/slide17.xml><?xml version="1.0" encoding="utf-8"?>
+<file path=ppt/slides/slide18.xml><?xml version="1.0" encoding="utf-8"?>
 <p:sld xmlns:a="http://schemas.openxmlformats.org/drawingml/2006/main" xmlns:r="http://schemas.openxmlformats.org/officeDocument/2006/relationships" xmlns:p="http://schemas.openxmlformats.org/presentationml/2006/main">
   <p:cSld>
     <p:spTree>
@@ -11219,7 +11287,1500 @@
 </p:sld>
 </file>
 
-<file path=ppt/slides/slide18.xml><?xml version="1.0" encoding="utf-8"?>
+<file path=ppt/slides/slide19.xml><?xml version="1.0" encoding="utf-8"?>
+<p:sld xmlns:a="http://schemas.openxmlformats.org/drawingml/2006/main" xmlns:r="http://schemas.openxmlformats.org/officeDocument/2006/relationships" xmlns:p="http://schemas.openxmlformats.org/presentationml/2006/main">
+  <p:cSld>
+    <p:spTree>
+      <p:nvGrpSpPr>
+        <p:cNvPr id="1" name=""/>
+        <p:cNvGrpSpPr/>
+        <p:nvPr/>
+      </p:nvGrpSpPr>
+      <p:grpSpPr>
+        <a:xfrm>
+          <a:off x="0" y="0"/>
+          <a:ext cx="0" cy="0"/>
+          <a:chOff x="0" y="0"/>
+          <a:chExt cx="0" cy="0"/>
+        </a:xfrm>
+      </p:grpSpPr>
+      <p:sp>
+        <p:nvSpPr>
+          <p:cNvPr id="2" name="Title 1"/>
+          <p:cNvSpPr>
+            <a:spLocks noGrp="1"/>
+          </p:cNvSpPr>
+          <p:nvPr>
+            <p:ph type="title"/>
+          </p:nvPr>
+        </p:nvSpPr>
+        <p:spPr/>
+        <p:txBody>
+          <a:bodyPr/>
+          <a:lstStyle/>
+          <a:p>
+            <a:endParaRPr lang="en-GB"/>
+          </a:p>
+        </p:txBody>
+      </p:sp>
+      <mc:AlternateContent xmlns:mc="http://schemas.openxmlformats.org/markup-compatibility/2006">
+        <mc:Choice xmlns:a14="http://schemas.microsoft.com/office/drawing/2010/main" Requires="a14">
+          <p:sp>
+            <p:nvSpPr>
+              <p:cNvPr id="3" name="Content Placeholder 2"/>
+              <p:cNvSpPr>
+                <a:spLocks noGrp="1"/>
+              </p:cNvSpPr>
+              <p:nvPr>
+                <p:ph idx="1"/>
+              </p:nvPr>
+            </p:nvSpPr>
+            <p:spPr>
+              <a:xfrm>
+                <a:off x="76200" y="838200"/>
+                <a:ext cx="6272134" cy="5943600"/>
+              </a:xfrm>
+            </p:spPr>
+            <p:txBody>
+              <a:bodyPr>
+                <a:normAutofit fontScale="77500" lnSpcReduction="20000"/>
+              </a:bodyPr>
+              <a:lstStyle/>
+              <a:p>
+                <a:pPr marL="0" indent="0">
+                  <a:buNone/>
+                </a:pPr>
+                <a:r>
+                  <a:rPr lang="en-US" dirty="0"/>
+                  <a:t>Simultaneous equation model</a:t>
+                </a:r>
+              </a:p>
+              <a:p>
+                <a:pPr marL="0" indent="0">
+                  <a:buNone/>
+                </a:pPr>
+                <a14:m>
+                  <m:oMathPara xmlns:m="http://schemas.openxmlformats.org/officeDocument/2006/math">
+                    <m:oMathParaPr>
+                      <m:jc m:val="centerGroup"/>
+                    </m:oMathParaPr>
+                    <m:oMath xmlns:m="http://schemas.openxmlformats.org/officeDocument/2006/math">
+                      <m:sSup>
+                        <m:sSupPr>
+                          <m:ctrlPr>
+                            <a:rPr lang="en-US" i="1"/>
+                          </m:ctrlPr>
+                        </m:sSupPr>
+                        <m:e>
+                          <m:r>
+                            <a:rPr lang="en-US" i="1"/>
+                            <m:t>𝜅</m:t>
+                          </m:r>
+                        </m:e>
+                        <m:sup>
+                          <m:r>
+                            <a:rPr lang="en-US" i="1"/>
+                            <m:t>2</m:t>
+                          </m:r>
+                        </m:sup>
+                      </m:sSup>
+                      <m:r>
+                        <a:rPr lang="en-US" b="1" i="1"/>
+                        <m:t>𝐂𝐱</m:t>
+                      </m:r>
+                      <m:r>
+                        <a:rPr lang="en-US" b="1" i="1"/>
+                        <m:t>=−</m:t>
+                      </m:r>
+                      <m:r>
+                        <a:rPr lang="en-US" b="1" i="1"/>
+                        <m:t>𝐆𝐱</m:t>
+                      </m:r>
+                      <m:r>
+                        <a:rPr lang="en-US" b="1" i="1"/>
+                        <m:t>+</m:t>
+                      </m:r>
+                      <m:r>
+                        <a:rPr lang="en-US" b="1" i="1"/>
+                        <m:t>𝛜</m:t>
+                      </m:r>
+                    </m:oMath>
+                  </m:oMathPara>
+                </a14:m>
+                <a:endParaRPr lang="en-US" b="1" dirty="0">
+                  <a:ea typeface="Cambria Math"/>
+                </a:endParaRPr>
+              </a:p>
+              <a:p>
+                <a:pPr marL="0" indent="0">
+                  <a:buNone/>
+                </a:pPr>
+                <a:r>
+                  <a:rPr lang="en-US" dirty="0">
+                    <a:ea typeface="Cambria Math"/>
+                  </a:rPr>
+                  <a:t>Where</a:t>
+                </a:r>
+              </a:p>
+              <a:p>
+                <a:pPr marL="0" indent="0">
+                  <a:buNone/>
+                </a:pPr>
+                <a14:m>
+                  <m:oMathPara xmlns:m="http://schemas.openxmlformats.org/officeDocument/2006/math">
+                    <m:oMathParaPr>
+                      <m:jc m:val="centerGroup"/>
+                    </m:oMathParaPr>
+                    <m:oMath xmlns:m="http://schemas.openxmlformats.org/officeDocument/2006/math">
+                      <m:r>
+                        <a:rPr lang="en-US" b="1" i="0" smtClean="0">
+                          <a:latin typeface="Cambria Math" panose="02040503050406030204" pitchFamily="18" charset="0"/>
+                          <a:ea typeface="Cambria Math"/>
+                        </a:rPr>
+                        <m:t>𝛜</m:t>
+                      </m:r>
+                      <m:r>
+                        <a:rPr lang="en-US" b="0" i="1" smtClean="0">
+                          <a:latin typeface="Cambria Math" panose="02040503050406030204" pitchFamily="18" charset="0"/>
+                          <a:ea typeface="Cambria Math"/>
+                        </a:rPr>
+                        <m:t>~</m:t>
+                      </m:r>
+                      <m:r>
+                        <m:rPr>
+                          <m:sty m:val="p"/>
+                        </m:rPr>
+                        <a:rPr lang="en-US" b="0" i="0" smtClean="0">
+                          <a:latin typeface="Cambria Math" panose="02040503050406030204" pitchFamily="18" charset="0"/>
+                          <a:ea typeface="Cambria Math"/>
+                        </a:rPr>
+                        <m:t>MVN</m:t>
+                      </m:r>
+                      <m:r>
+                        <a:rPr lang="en-US" b="0" i="1" smtClean="0">
+                          <a:latin typeface="Cambria Math" panose="02040503050406030204" pitchFamily="18" charset="0"/>
+                          <a:ea typeface="Cambria Math"/>
+                        </a:rPr>
+                        <m:t>(</m:t>
+                      </m:r>
+                      <m:r>
+                        <a:rPr lang="en-US" b="1" i="0" smtClean="0">
+                          <a:latin typeface="Cambria Math" panose="02040503050406030204" pitchFamily="18" charset="0"/>
+                          <a:ea typeface="Cambria Math"/>
+                        </a:rPr>
+                        <m:t>𝟎</m:t>
+                      </m:r>
+                      <m:r>
+                        <a:rPr lang="en-US" b="1" i="0" smtClean="0">
+                          <a:latin typeface="Cambria Math" panose="02040503050406030204" pitchFamily="18" charset="0"/>
+                          <a:ea typeface="Cambria Math"/>
+                        </a:rPr>
+                        <m:t>,</m:t>
+                      </m:r>
+                      <m:r>
+                        <a:rPr lang="en-US" b="1" i="0" smtClean="0">
+                          <a:latin typeface="Cambria Math" panose="02040503050406030204" pitchFamily="18" charset="0"/>
+                          <a:ea typeface="Cambria Math"/>
+                        </a:rPr>
+                        <m:t>𝐂</m:t>
+                      </m:r>
+                      <m:r>
+                        <a:rPr lang="en-US" b="0" i="1" smtClean="0">
+                          <a:latin typeface="Cambria Math" panose="02040503050406030204" pitchFamily="18" charset="0"/>
+                          <a:ea typeface="Cambria Math"/>
+                        </a:rPr>
+                        <m:t>)</m:t>
+                      </m:r>
+                    </m:oMath>
+                  </m:oMathPara>
+                </a14:m>
+                <a:endParaRPr lang="en-US" dirty="0">
+                  <a:ea typeface="Cambria Math"/>
+                </a:endParaRPr>
+              </a:p>
+              <a:p>
+                <a:pPr marL="0" indent="0">
+                  <a:buNone/>
+                </a:pPr>
+                <a14:m>
+                  <m:oMath xmlns:m="http://schemas.openxmlformats.org/officeDocument/2006/math">
+                    <m:r>
+                      <a:rPr lang="en-US" b="1" i="0" smtClean="0">
+                        <a:latin typeface="Cambria Math" panose="02040503050406030204" pitchFamily="18" charset="0"/>
+                        <a:ea typeface="Cambria Math"/>
+                      </a:rPr>
+                      <m:t>𝐂</m:t>
+                    </m:r>
+                  </m:oMath>
+                </a14:m>
+                <a:r>
+                  <a:rPr lang="en-US" dirty="0">
+                    <a:ea typeface="Cambria Math"/>
+                  </a:rPr>
+                  <a:t> is the area for each basis function</a:t>
+                </a:r>
+              </a:p>
+              <a:p>
+                <a:pPr marL="0" indent="0">
+                  <a:buNone/>
+                </a:pPr>
+                <a14:m>
+                  <m:oMath xmlns:m="http://schemas.openxmlformats.org/officeDocument/2006/math">
+                    <m:r>
+                      <a:rPr lang="en-US" b="1" i="0" smtClean="0">
+                        <a:latin typeface="Cambria Math" panose="02040503050406030204" pitchFamily="18" charset="0"/>
+                        <a:ea typeface="Cambria Math"/>
+                      </a:rPr>
+                      <m:t>𝐆</m:t>
+                    </m:r>
+                  </m:oMath>
+                </a14:m>
+                <a:r>
+                  <a:rPr lang="en-US" dirty="0">
+                    <a:ea typeface="Cambria Math"/>
+                  </a:rPr>
+                  <a:t> is the area of overlap between each basis function</a:t>
+                </a:r>
+              </a:p>
+              <a:p>
+                <a:pPr marL="0" indent="0">
+                  <a:buNone/>
+                </a:pPr>
+                <a:endParaRPr lang="en-US" dirty="0">
+                  <a:ea typeface="Cambria Math"/>
+                </a:endParaRPr>
+              </a:p>
+              <a:p>
+                <a:pPr marL="0" indent="0">
+                  <a:buNone/>
+                </a:pPr>
+                <a:r>
+                  <a:rPr lang="en-US" dirty="0">
+                    <a:ea typeface="Cambria Math"/>
+                  </a:rPr>
+                  <a:t>Doing some algebra:</a:t>
+                </a:r>
+              </a:p>
+              <a:p>
+                <a:pPr marL="0" indent="0">
+                  <a:buNone/>
+                </a:pPr>
+                <a14:m>
+                  <m:oMathPara xmlns:m="http://schemas.openxmlformats.org/officeDocument/2006/math">
+                    <m:oMathParaPr>
+                      <m:jc m:val="centerGroup"/>
+                    </m:oMathParaPr>
+                    <m:oMath xmlns:m="http://schemas.openxmlformats.org/officeDocument/2006/math">
+                      <m:d>
+                        <m:dPr>
+                          <m:ctrlPr>
+                            <a:rPr lang="en-US" b="0" i="1" smtClean="0">
+                              <a:latin typeface="Cambria Math" panose="02040503050406030204" pitchFamily="18" charset="0"/>
+                              <a:ea typeface="Cambria Math"/>
+                            </a:rPr>
+                          </m:ctrlPr>
+                        </m:dPr>
+                        <m:e>
+                          <m:sSup>
+                            <m:sSupPr>
+                              <m:ctrlPr>
+                                <a:rPr lang="en-US" b="0" i="1" smtClean="0">
+                                  <a:latin typeface="Cambria Math" panose="02040503050406030204" pitchFamily="18" charset="0"/>
+                                  <a:ea typeface="Cambria Math"/>
+                                </a:rPr>
+                              </m:ctrlPr>
+                            </m:sSupPr>
+                            <m:e>
+                              <m:r>
+                                <a:rPr lang="en-US" b="0" i="1" smtClean="0">
+                                  <a:latin typeface="Cambria Math" panose="02040503050406030204" pitchFamily="18" charset="0"/>
+                                  <a:ea typeface="Cambria Math"/>
+                                </a:rPr>
+                                <m:t>𝜅</m:t>
+                              </m:r>
+                            </m:e>
+                            <m:sup>
+                              <m:r>
+                                <a:rPr lang="en-US" b="0" i="1" smtClean="0">
+                                  <a:latin typeface="Cambria Math" panose="02040503050406030204" pitchFamily="18" charset="0"/>
+                                  <a:ea typeface="Cambria Math"/>
+                                </a:rPr>
+                                <m:t>2</m:t>
+                              </m:r>
+                            </m:sup>
+                          </m:sSup>
+                          <m:r>
+                            <a:rPr lang="en-US" b="1" i="0" smtClean="0">
+                              <a:latin typeface="Cambria Math" panose="02040503050406030204" pitchFamily="18" charset="0"/>
+                              <a:ea typeface="Cambria Math"/>
+                            </a:rPr>
+                            <m:t>𝐂</m:t>
+                          </m:r>
+                          <m:r>
+                            <a:rPr lang="en-US" b="1" i="0" smtClean="0">
+                              <a:latin typeface="Cambria Math" panose="02040503050406030204" pitchFamily="18" charset="0"/>
+                              <a:ea typeface="Cambria Math"/>
+                            </a:rPr>
+                            <m:t>+</m:t>
+                          </m:r>
+                          <m:r>
+                            <a:rPr lang="en-US" b="1" i="0" smtClean="0">
+                              <a:latin typeface="Cambria Math" panose="02040503050406030204" pitchFamily="18" charset="0"/>
+                              <a:ea typeface="Cambria Math"/>
+                            </a:rPr>
+                            <m:t>𝐆</m:t>
+                          </m:r>
+                        </m:e>
+                      </m:d>
+                      <m:r>
+                        <a:rPr lang="en-US" b="1" i="0" smtClean="0">
+                          <a:latin typeface="Cambria Math" panose="02040503050406030204" pitchFamily="18" charset="0"/>
+                          <a:ea typeface="Cambria Math"/>
+                        </a:rPr>
+                        <m:t>𝐱</m:t>
+                      </m:r>
+                      <m:r>
+                        <a:rPr lang="en-US" b="0" i="1" smtClean="0">
+                          <a:latin typeface="Cambria Math" panose="02040503050406030204" pitchFamily="18" charset="0"/>
+                          <a:ea typeface="Cambria Math"/>
+                        </a:rPr>
+                        <m:t>=</m:t>
+                      </m:r>
+                      <m:r>
+                        <a:rPr lang="en-US" b="1" i="0" smtClean="0">
+                          <a:latin typeface="Cambria Math" panose="02040503050406030204" pitchFamily="18" charset="0"/>
+                          <a:ea typeface="Cambria Math"/>
+                        </a:rPr>
+                        <m:t>𝛜</m:t>
+                      </m:r>
+                    </m:oMath>
+                  </m:oMathPara>
+                </a14:m>
+                <a:endParaRPr lang="en-US" b="1" dirty="0">
+                  <a:ea typeface="Cambria Math"/>
+                </a:endParaRPr>
+              </a:p>
+              <a:p>
+                <a:pPr marL="0" indent="0">
+                  <a:buNone/>
+                </a:pPr>
+                <a:r>
+                  <a:rPr lang="en-US" dirty="0">
+                    <a:ea typeface="Cambria Math"/>
+                  </a:rPr>
+                  <a:t>So: </a:t>
+                </a:r>
+              </a:p>
+              <a:p>
+                <a:pPr marL="0" indent="0">
+                  <a:buNone/>
+                </a:pPr>
+                <a14:m>
+                  <m:oMathPara xmlns:m="http://schemas.openxmlformats.org/officeDocument/2006/math">
+                    <m:oMathParaPr>
+                      <m:jc m:val="centerGroup"/>
+                    </m:oMathParaPr>
+                    <m:oMath xmlns:m="http://schemas.openxmlformats.org/officeDocument/2006/math">
+                      <m:r>
+                        <a:rPr lang="en-US" b="1" i="0" smtClean="0">
+                          <a:latin typeface="Cambria Math" panose="02040503050406030204" pitchFamily="18" charset="0"/>
+                          <a:ea typeface="Cambria Math"/>
+                        </a:rPr>
+                        <m:t>𝐱</m:t>
+                      </m:r>
+                      <m:r>
+                        <a:rPr lang="en-US" b="0" i="1" smtClean="0">
+                          <a:latin typeface="Cambria Math" panose="02040503050406030204" pitchFamily="18" charset="0"/>
+                          <a:ea typeface="Cambria Math"/>
+                        </a:rPr>
+                        <m:t>~</m:t>
+                      </m:r>
+                      <m:r>
+                        <m:rPr>
+                          <m:sty m:val="p"/>
+                        </m:rPr>
+                        <a:rPr lang="en-US" b="0" i="0" smtClean="0">
+                          <a:latin typeface="Cambria Math" panose="02040503050406030204" pitchFamily="18" charset="0"/>
+                          <a:ea typeface="Cambria Math"/>
+                        </a:rPr>
+                        <m:t>MVN</m:t>
+                      </m:r>
+                      <m:d>
+                        <m:dPr>
+                          <m:ctrlPr>
+                            <a:rPr lang="en-US" b="0" i="1" smtClean="0">
+                              <a:latin typeface="Cambria Math" panose="02040503050406030204" pitchFamily="18" charset="0"/>
+                              <a:ea typeface="Cambria Math"/>
+                            </a:rPr>
+                          </m:ctrlPr>
+                        </m:dPr>
+                        <m:e>
+                          <m:r>
+                            <a:rPr lang="en-US" b="0" i="1" smtClean="0">
+                              <a:latin typeface="Cambria Math" panose="02040503050406030204" pitchFamily="18" charset="0"/>
+                              <a:ea typeface="Cambria Math"/>
+                            </a:rPr>
+                            <m:t>0,</m:t>
+                          </m:r>
+                          <m:sSup>
+                            <m:sSupPr>
+                              <m:ctrlPr>
+                                <a:rPr lang="en-US" b="0" i="1" smtClean="0">
+                                  <a:latin typeface="Cambria Math" panose="02040503050406030204" pitchFamily="18" charset="0"/>
+                                  <a:ea typeface="Cambria Math"/>
+                                </a:rPr>
+                              </m:ctrlPr>
+                            </m:sSupPr>
+                            <m:e>
+                              <m:d>
+                                <m:dPr>
+                                  <m:ctrlPr>
+                                    <a:rPr lang="en-US" i="1">
+                                      <a:latin typeface="Cambria Math" panose="02040503050406030204" pitchFamily="18" charset="0"/>
+                                      <a:ea typeface="Cambria Math"/>
+                                    </a:rPr>
+                                  </m:ctrlPr>
+                                </m:dPr>
+                                <m:e>
+                                  <m:sSup>
+                                    <m:sSupPr>
+                                      <m:ctrlPr>
+                                        <a:rPr lang="en-US" i="1">
+                                          <a:latin typeface="Cambria Math" panose="02040503050406030204" pitchFamily="18" charset="0"/>
+                                          <a:ea typeface="Cambria Math"/>
+                                        </a:rPr>
+                                      </m:ctrlPr>
+                                    </m:sSupPr>
+                                    <m:e>
+                                      <m:r>
+                                        <a:rPr lang="en-US" i="1">
+                                          <a:latin typeface="Cambria Math" panose="02040503050406030204" pitchFamily="18" charset="0"/>
+                                          <a:ea typeface="Cambria Math"/>
+                                        </a:rPr>
+                                        <m:t>𝜅</m:t>
+                                      </m:r>
+                                    </m:e>
+                                    <m:sup>
+                                      <m:r>
+                                        <a:rPr lang="en-US" i="1">
+                                          <a:latin typeface="Cambria Math" panose="02040503050406030204" pitchFamily="18" charset="0"/>
+                                          <a:ea typeface="Cambria Math"/>
+                                        </a:rPr>
+                                        <m:t>2</m:t>
+                                      </m:r>
+                                    </m:sup>
+                                  </m:sSup>
+                                  <m:r>
+                                    <a:rPr lang="en-US" b="1">
+                                      <a:latin typeface="Cambria Math" panose="02040503050406030204" pitchFamily="18" charset="0"/>
+                                      <a:ea typeface="Cambria Math"/>
+                                    </a:rPr>
+                                    <m:t>𝐂</m:t>
+                                  </m:r>
+                                  <m:r>
+                                    <a:rPr lang="en-US" b="1">
+                                      <a:latin typeface="Cambria Math" panose="02040503050406030204" pitchFamily="18" charset="0"/>
+                                      <a:ea typeface="Cambria Math"/>
+                                    </a:rPr>
+                                    <m:t>+</m:t>
+                                  </m:r>
+                                  <m:r>
+                                    <a:rPr lang="en-US" b="1">
+                                      <a:latin typeface="Cambria Math" panose="02040503050406030204" pitchFamily="18" charset="0"/>
+                                      <a:ea typeface="Cambria Math"/>
+                                    </a:rPr>
+                                    <m:t>𝐆</m:t>
+                                  </m:r>
+                                </m:e>
+                              </m:d>
+                            </m:e>
+                            <m:sup>
+                              <m:r>
+                                <a:rPr lang="en-US" b="0" i="1" smtClean="0">
+                                  <a:latin typeface="Cambria Math" panose="02040503050406030204" pitchFamily="18" charset="0"/>
+                                  <a:ea typeface="Cambria Math"/>
+                                </a:rPr>
+                                <m:t>−1</m:t>
+                              </m:r>
+                            </m:sup>
+                          </m:sSup>
+                          <m:r>
+                            <a:rPr lang="en-US" b="1" i="0" smtClean="0">
+                              <a:latin typeface="Cambria Math" panose="02040503050406030204" pitchFamily="18" charset="0"/>
+                              <a:ea typeface="Cambria Math"/>
+                            </a:rPr>
+                            <m:t>𝐂</m:t>
+                          </m:r>
+                          <m:sSup>
+                            <m:sSupPr>
+                              <m:ctrlPr>
+                                <a:rPr lang="en-US" b="0" i="1" smtClean="0">
+                                  <a:latin typeface="Cambria Math" panose="02040503050406030204" pitchFamily="18" charset="0"/>
+                                  <a:ea typeface="Cambria Math"/>
+                                </a:rPr>
+                              </m:ctrlPr>
+                            </m:sSupPr>
+                            <m:e>
+                              <m:d>
+                                <m:dPr>
+                                  <m:ctrlPr>
+                                    <a:rPr lang="en-US" i="1">
+                                      <a:latin typeface="Cambria Math" panose="02040503050406030204" pitchFamily="18" charset="0"/>
+                                      <a:ea typeface="Cambria Math"/>
+                                    </a:rPr>
+                                  </m:ctrlPr>
+                                </m:dPr>
+                                <m:e>
+                                  <m:sSup>
+                                    <m:sSupPr>
+                                      <m:ctrlPr>
+                                        <a:rPr lang="en-US" i="1">
+                                          <a:latin typeface="Cambria Math" panose="02040503050406030204" pitchFamily="18" charset="0"/>
+                                          <a:ea typeface="Cambria Math"/>
+                                        </a:rPr>
+                                      </m:ctrlPr>
+                                    </m:sSupPr>
+                                    <m:e>
+                                      <m:r>
+                                        <a:rPr lang="en-US" i="1">
+                                          <a:latin typeface="Cambria Math" panose="02040503050406030204" pitchFamily="18" charset="0"/>
+                                          <a:ea typeface="Cambria Math"/>
+                                        </a:rPr>
+                                        <m:t>𝜅</m:t>
+                                      </m:r>
+                                    </m:e>
+                                    <m:sup>
+                                      <m:r>
+                                        <a:rPr lang="en-US" i="1">
+                                          <a:latin typeface="Cambria Math" panose="02040503050406030204" pitchFamily="18" charset="0"/>
+                                          <a:ea typeface="Cambria Math"/>
+                                        </a:rPr>
+                                        <m:t>2</m:t>
+                                      </m:r>
+                                    </m:sup>
+                                  </m:sSup>
+                                  <m:r>
+                                    <a:rPr lang="en-US" b="1">
+                                      <a:latin typeface="Cambria Math" panose="02040503050406030204" pitchFamily="18" charset="0"/>
+                                      <a:ea typeface="Cambria Math"/>
+                                    </a:rPr>
+                                    <m:t>𝐂</m:t>
+                                  </m:r>
+                                  <m:r>
+                                    <a:rPr lang="en-US" b="1">
+                                      <a:latin typeface="Cambria Math" panose="02040503050406030204" pitchFamily="18" charset="0"/>
+                                      <a:ea typeface="Cambria Math"/>
+                                    </a:rPr>
+                                    <m:t>+</m:t>
+                                  </m:r>
+                                  <m:r>
+                                    <a:rPr lang="en-US" b="1">
+                                      <a:latin typeface="Cambria Math" panose="02040503050406030204" pitchFamily="18" charset="0"/>
+                                      <a:ea typeface="Cambria Math"/>
+                                    </a:rPr>
+                                    <m:t>𝐆</m:t>
+                                  </m:r>
+                                </m:e>
+                              </m:d>
+                            </m:e>
+                            <m:sup>
+                              <m:r>
+                                <a:rPr lang="en-US" b="0" i="1" smtClean="0">
+                                  <a:latin typeface="Cambria Math" panose="02040503050406030204" pitchFamily="18" charset="0"/>
+                                  <a:ea typeface="Cambria Math"/>
+                                </a:rPr>
+                                <m:t>−1</m:t>
+                              </m:r>
+                            </m:sup>
+                          </m:sSup>
+                        </m:e>
+                      </m:d>
+                    </m:oMath>
+                  </m:oMathPara>
+                </a14:m>
+                <a:endParaRPr lang="en-US" dirty="0">
+                  <a:ea typeface="Cambria Math"/>
+                </a:endParaRPr>
+              </a:p>
+              <a:p>
+                <a:pPr marL="0" indent="0">
+                  <a:buNone/>
+                </a:pPr>
+                <a:r>
+                  <a:rPr lang="en-US" dirty="0">
+                    <a:ea typeface="Cambria Math"/>
+                  </a:rPr>
+                  <a:t>Or:</a:t>
+                </a:r>
+              </a:p>
+              <a:p>
+                <a:pPr marL="0" indent="0">
+                  <a:buNone/>
+                </a:pPr>
+                <a14:m>
+                  <m:oMathPara xmlns:m="http://schemas.openxmlformats.org/officeDocument/2006/math">
+                    <m:oMathParaPr>
+                      <m:jc m:val="centerGroup"/>
+                    </m:oMathParaPr>
+                    <m:oMath xmlns:m="http://schemas.openxmlformats.org/officeDocument/2006/math">
+                      <m:sSup>
+                        <m:sSupPr>
+                          <m:ctrlPr>
+                            <a:rPr lang="en-US" b="0" i="1" smtClean="0">
+                              <a:latin typeface="Cambria Math" panose="02040503050406030204" pitchFamily="18" charset="0"/>
+                              <a:ea typeface="Cambria Math"/>
+                            </a:rPr>
+                          </m:ctrlPr>
+                        </m:sSupPr>
+                        <m:e>
+                          <m:r>
+                            <a:rPr lang="en-US" b="1" i="0" smtClean="0">
+                              <a:latin typeface="Cambria Math" panose="02040503050406030204" pitchFamily="18" charset="0"/>
+                              <a:ea typeface="Cambria Math"/>
+                            </a:rPr>
+                            <m:t>𝚺</m:t>
+                          </m:r>
+                        </m:e>
+                        <m:sup>
+                          <m:r>
+                            <a:rPr lang="en-US" b="0" i="1" smtClean="0">
+                              <a:latin typeface="Cambria Math" panose="02040503050406030204" pitchFamily="18" charset="0"/>
+                              <a:ea typeface="Cambria Math"/>
+                            </a:rPr>
+                            <m:t>−1</m:t>
+                          </m:r>
+                        </m:sup>
+                      </m:sSup>
+                      <m:r>
+                        <a:rPr lang="en-US" b="0" i="1" smtClean="0">
+                          <a:latin typeface="Cambria Math" panose="02040503050406030204" pitchFamily="18" charset="0"/>
+                          <a:ea typeface="Cambria Math"/>
+                        </a:rPr>
+                        <m:t>=</m:t>
+                      </m:r>
+                      <m:r>
+                        <a:rPr lang="en-US" b="1" i="0" smtClean="0">
+                          <a:latin typeface="Cambria Math" panose="02040503050406030204" pitchFamily="18" charset="0"/>
+                          <a:ea typeface="Cambria Math"/>
+                        </a:rPr>
+                        <m:t>𝐐</m:t>
+                      </m:r>
+                      <m:r>
+                        <a:rPr lang="en-US" b="0" i="1" smtClean="0">
+                          <a:latin typeface="Cambria Math" panose="02040503050406030204" pitchFamily="18" charset="0"/>
+                          <a:ea typeface="Cambria Math"/>
+                        </a:rPr>
+                        <m:t>=</m:t>
+                      </m:r>
+                      <m:d>
+                        <m:dPr>
+                          <m:ctrlPr>
+                            <a:rPr lang="en-US" i="1">
+                              <a:latin typeface="Cambria Math" panose="02040503050406030204" pitchFamily="18" charset="0"/>
+                              <a:ea typeface="Cambria Math"/>
+                            </a:rPr>
+                          </m:ctrlPr>
+                        </m:dPr>
+                        <m:e>
+                          <m:sSup>
+                            <m:sSupPr>
+                              <m:ctrlPr>
+                                <a:rPr lang="en-US" i="1">
+                                  <a:latin typeface="Cambria Math" panose="02040503050406030204" pitchFamily="18" charset="0"/>
+                                  <a:ea typeface="Cambria Math"/>
+                                </a:rPr>
+                              </m:ctrlPr>
+                            </m:sSupPr>
+                            <m:e>
+                              <m:r>
+                                <a:rPr lang="en-US" i="1">
+                                  <a:latin typeface="Cambria Math" panose="02040503050406030204" pitchFamily="18" charset="0"/>
+                                  <a:ea typeface="Cambria Math"/>
+                                </a:rPr>
+                                <m:t>𝜅</m:t>
+                              </m:r>
+                            </m:e>
+                            <m:sup>
+                              <m:r>
+                                <a:rPr lang="en-US" i="1">
+                                  <a:latin typeface="Cambria Math" panose="02040503050406030204" pitchFamily="18" charset="0"/>
+                                  <a:ea typeface="Cambria Math"/>
+                                </a:rPr>
+                                <m:t>2</m:t>
+                              </m:r>
+                            </m:sup>
+                          </m:sSup>
+                          <m:r>
+                            <a:rPr lang="en-US" b="1">
+                              <a:latin typeface="Cambria Math" panose="02040503050406030204" pitchFamily="18" charset="0"/>
+                              <a:ea typeface="Cambria Math"/>
+                            </a:rPr>
+                            <m:t>𝐂</m:t>
+                          </m:r>
+                          <m:r>
+                            <a:rPr lang="en-US" b="1">
+                              <a:latin typeface="Cambria Math" panose="02040503050406030204" pitchFamily="18" charset="0"/>
+                              <a:ea typeface="Cambria Math"/>
+                            </a:rPr>
+                            <m:t>+</m:t>
+                          </m:r>
+                          <m:r>
+                            <a:rPr lang="en-US" b="1">
+                              <a:latin typeface="Cambria Math" panose="02040503050406030204" pitchFamily="18" charset="0"/>
+                              <a:ea typeface="Cambria Math"/>
+                            </a:rPr>
+                            <m:t>𝐆</m:t>
+                          </m:r>
+                        </m:e>
+                      </m:d>
+                      <m:sSup>
+                        <m:sSupPr>
+                          <m:ctrlPr>
+                            <a:rPr lang="en-US" b="1" i="0" smtClean="0">
+                              <a:latin typeface="Cambria Math" panose="02040503050406030204" pitchFamily="18" charset="0"/>
+                              <a:ea typeface="Cambria Math"/>
+                            </a:rPr>
+                          </m:ctrlPr>
+                        </m:sSupPr>
+                        <m:e>
+                          <m:r>
+                            <a:rPr lang="en-US" b="1">
+                              <a:latin typeface="Cambria Math" panose="02040503050406030204" pitchFamily="18" charset="0"/>
+                              <a:ea typeface="Cambria Math"/>
+                            </a:rPr>
+                            <m:t>𝐂</m:t>
+                          </m:r>
+                        </m:e>
+                        <m:sup>
+                          <m:r>
+                            <a:rPr lang="en-US" b="1" i="0" smtClean="0">
+                              <a:latin typeface="Cambria Math" panose="02040503050406030204" pitchFamily="18" charset="0"/>
+                              <a:ea typeface="Cambria Math"/>
+                            </a:rPr>
+                            <m:t>−</m:t>
+                          </m:r>
+                          <m:r>
+                            <a:rPr lang="en-US" b="1" i="0" smtClean="0">
+                              <a:latin typeface="Cambria Math" panose="02040503050406030204" pitchFamily="18" charset="0"/>
+                              <a:ea typeface="Cambria Math"/>
+                            </a:rPr>
+                            <m:t>𝟏</m:t>
+                          </m:r>
+                        </m:sup>
+                      </m:sSup>
+                      <m:d>
+                        <m:dPr>
+                          <m:ctrlPr>
+                            <a:rPr lang="en-US" i="1">
+                              <a:latin typeface="Cambria Math" panose="02040503050406030204" pitchFamily="18" charset="0"/>
+                              <a:ea typeface="Cambria Math"/>
+                            </a:rPr>
+                          </m:ctrlPr>
+                        </m:dPr>
+                        <m:e>
+                          <m:sSup>
+                            <m:sSupPr>
+                              <m:ctrlPr>
+                                <a:rPr lang="en-US" i="1">
+                                  <a:latin typeface="Cambria Math" panose="02040503050406030204" pitchFamily="18" charset="0"/>
+                                  <a:ea typeface="Cambria Math"/>
+                                </a:rPr>
+                              </m:ctrlPr>
+                            </m:sSupPr>
+                            <m:e>
+                              <m:r>
+                                <a:rPr lang="en-US" i="1">
+                                  <a:latin typeface="Cambria Math" panose="02040503050406030204" pitchFamily="18" charset="0"/>
+                                  <a:ea typeface="Cambria Math"/>
+                                </a:rPr>
+                                <m:t>𝜅</m:t>
+                              </m:r>
+                            </m:e>
+                            <m:sup>
+                              <m:r>
+                                <a:rPr lang="en-US" i="1">
+                                  <a:latin typeface="Cambria Math" panose="02040503050406030204" pitchFamily="18" charset="0"/>
+                                  <a:ea typeface="Cambria Math"/>
+                                </a:rPr>
+                                <m:t>2</m:t>
+                              </m:r>
+                            </m:sup>
+                          </m:sSup>
+                          <m:r>
+                            <a:rPr lang="en-US" b="1">
+                              <a:latin typeface="Cambria Math" panose="02040503050406030204" pitchFamily="18" charset="0"/>
+                              <a:ea typeface="Cambria Math"/>
+                            </a:rPr>
+                            <m:t>𝐂</m:t>
+                          </m:r>
+                          <m:r>
+                            <a:rPr lang="en-US" b="1">
+                              <a:latin typeface="Cambria Math" panose="02040503050406030204" pitchFamily="18" charset="0"/>
+                              <a:ea typeface="Cambria Math"/>
+                            </a:rPr>
+                            <m:t>+</m:t>
+                          </m:r>
+                          <m:r>
+                            <a:rPr lang="en-US" b="1">
+                              <a:latin typeface="Cambria Math" panose="02040503050406030204" pitchFamily="18" charset="0"/>
+                              <a:ea typeface="Cambria Math"/>
+                            </a:rPr>
+                            <m:t>𝐆</m:t>
+                          </m:r>
+                        </m:e>
+                      </m:d>
+                    </m:oMath>
+                  </m:oMathPara>
+                </a14:m>
+                <a:endParaRPr lang="en-US" dirty="0">
+                  <a:ea typeface="Cambria Math"/>
+                </a:endParaRPr>
+              </a:p>
+            </p:txBody>
+          </p:sp>
+        </mc:Choice>
+        <mc:Fallback>
+          <p:sp>
+            <p:nvSpPr>
+              <p:cNvPr id="3" name="Content Placeholder 2"/>
+              <p:cNvSpPr>
+                <a:spLocks noGrp="1" noRot="1" noChangeAspect="1" noMove="1" noResize="1" noEditPoints="1" noAdjustHandles="1" noChangeArrowheads="1" noChangeShapeType="1" noTextEdit="1"/>
+              </p:cNvSpPr>
+              <p:nvPr>
+                <p:ph idx="1"/>
+              </p:nvPr>
+            </p:nvSpPr>
+            <p:spPr>
+              <a:xfrm>
+                <a:off x="76200" y="838200"/>
+                <a:ext cx="6272134" cy="5943600"/>
+              </a:xfrm>
+              <a:blipFill>
+                <a:blip r:embed="rId2"/>
+                <a:stretch>
+                  <a:fillRect l="-1265" t="-1744"/>
+                </a:stretch>
+              </a:blipFill>
+            </p:spPr>
+            <p:txBody>
+              <a:bodyPr/>
+              <a:lstStyle/>
+              <a:p>
+                <a:r>
+                  <a:rPr lang="en-US">
+                    <a:noFill/>
+                  </a:rPr>
+                  <a:t> </a:t>
+                </a:r>
+              </a:p>
+            </p:txBody>
+          </p:sp>
+        </mc:Fallback>
+      </mc:AlternateContent>
+      <p:pic>
+        <p:nvPicPr>
+          <p:cNvPr id="5" name="Picture 4"/>
+          <p:cNvPicPr>
+            <a:picLocks noChangeAspect="1"/>
+          </p:cNvPicPr>
+          <p:nvPr/>
+        </p:nvPicPr>
+        <p:blipFill rotWithShape="1">
+          <a:blip r:embed="rId3" cstate="print">
+            <a:extLst>
+              <a:ext uri="{28A0092B-C50C-407E-A947-70E740481C1C}">
+                <a14:useLocalDpi xmlns:a14="http://schemas.microsoft.com/office/drawing/2010/main" val="0"/>
+              </a:ext>
+            </a:extLst>
+          </a:blip>
+          <a:srcRect l="49922" t="-130"/>
+          <a:stretch/>
+        </p:blipFill>
+        <p:spPr>
+          <a:xfrm>
+            <a:off x="6193136" y="885710"/>
+            <a:ext cx="2874664" cy="2873934"/>
+          </a:xfrm>
+          <a:prstGeom prst="rect">
+            <a:avLst/>
+          </a:prstGeom>
+        </p:spPr>
+      </p:pic>
+    </p:spTree>
+    <p:extLst>
+      <p:ext uri="{BB962C8B-B14F-4D97-AF65-F5344CB8AC3E}">
+        <p14:creationId xmlns:p14="http://schemas.microsoft.com/office/powerpoint/2010/main" val="1533536871"/>
+      </p:ext>
+    </p:extLst>
+  </p:cSld>
+  <p:clrMapOvr>
+    <a:masterClrMapping/>
+  </p:clrMapOvr>
+</p:sld>
+</file>
+
+<file path=ppt/slides/slide2.xml><?xml version="1.0" encoding="utf-8"?>
+<p:sld xmlns:a="http://schemas.openxmlformats.org/drawingml/2006/main" xmlns:r="http://schemas.openxmlformats.org/officeDocument/2006/relationships" xmlns:p="http://schemas.openxmlformats.org/presentationml/2006/main">
+  <p:cSld>
+    <p:spTree>
+      <p:nvGrpSpPr>
+        <p:cNvPr id="1" name=""/>
+        <p:cNvGrpSpPr/>
+        <p:nvPr/>
+      </p:nvGrpSpPr>
+      <p:grpSpPr>
+        <a:xfrm>
+          <a:off x="0" y="0"/>
+          <a:ext cx="0" cy="0"/>
+          <a:chOff x="0" y="0"/>
+          <a:chExt cx="0" cy="0"/>
+        </a:xfrm>
+      </p:grpSpPr>
+      <p:sp>
+        <p:nvSpPr>
+          <p:cNvPr id="2" name="Title 1"/>
+          <p:cNvSpPr>
+            <a:spLocks noGrp="1"/>
+          </p:cNvSpPr>
+          <p:nvPr>
+            <p:ph type="title"/>
+          </p:nvPr>
+        </p:nvSpPr>
+        <p:spPr/>
+        <p:txBody>
+          <a:bodyPr>
+            <a:normAutofit fontScale="90000"/>
+          </a:bodyPr>
+          <a:lstStyle/>
+          <a:p>
+            <a:r>
+              <a:rPr lang="en-US" dirty="0"/>
+              <a:t>Why might we care about 2D spatial models?</a:t>
+            </a:r>
+          </a:p>
+        </p:txBody>
+      </p:sp>
+      <p:sp>
+        <p:nvSpPr>
+          <p:cNvPr id="3" name="Slide Number Placeholder 2"/>
+          <p:cNvSpPr>
+            <a:spLocks noGrp="1"/>
+          </p:cNvSpPr>
+          <p:nvPr>
+            <p:ph type="sldNum" sz="quarter" idx="12"/>
+          </p:nvPr>
+        </p:nvSpPr>
+        <p:spPr/>
+        <p:txBody>
+          <a:bodyPr/>
+          <a:lstStyle/>
+          <a:p>
+            <a:pPr marL="0" marR="0" lvl="0" indent="0" algn="r" defTabSz="914400" rtl="0" eaLnBrk="1" fontAlgn="auto" latinLnBrk="0" hangingPunct="1">
+              <a:lnSpc>
+                <a:spcPct val="100000"/>
+              </a:lnSpc>
+              <a:spcBef>
+                <a:spcPts val="0"/>
+              </a:spcBef>
+              <a:spcAft>
+                <a:spcPts val="0"/>
+              </a:spcAft>
+              <a:buClrTx/>
+              <a:buSzTx/>
+              <a:buFontTx/>
+              <a:buNone/>
+              <a:tabLst/>
+              <a:defRPr/>
+            </a:pPr>
+            <a:fld id="{E0FF4530-C0A9-489F-AD78-78B1E4B1E710}" type="slidenum">
+              <a:rPr kumimoji="0" lang="en-US" sz="1200" b="0" i="0" u="none" strike="noStrike" kern="1200" cap="none" spc="0" normalizeH="0" baseline="0" noProof="0" smtClean="0">
+                <a:ln>
+                  <a:noFill/>
+                </a:ln>
+                <a:solidFill>
+                  <a:prstClr val="black">
+                    <a:tint val="75000"/>
+                  </a:prstClr>
+                </a:solidFill>
+                <a:effectLst/>
+                <a:uLnTx/>
+                <a:uFillTx/>
+                <a:latin typeface="Calibri"/>
+                <a:ea typeface="+mn-ea"/>
+                <a:cs typeface="+mn-cs"/>
+              </a:rPr>
+              <a:pPr marL="0" marR="0" lvl="0" indent="0" algn="r" defTabSz="914400" rtl="0" eaLnBrk="1" fontAlgn="auto" latinLnBrk="0" hangingPunct="1">
+                <a:lnSpc>
+                  <a:spcPct val="100000"/>
+                </a:lnSpc>
+                <a:spcBef>
+                  <a:spcPts val="0"/>
+                </a:spcBef>
+                <a:spcAft>
+                  <a:spcPts val="0"/>
+                </a:spcAft>
+                <a:buClrTx/>
+                <a:buSzTx/>
+                <a:buFontTx/>
+                <a:buNone/>
+                <a:tabLst/>
+                <a:defRPr/>
+              </a:pPr>
+              <a:t>2</a:t>
+            </a:fld>
+            <a:endParaRPr kumimoji="0" lang="en-US" sz="1200" b="0" i="0" u="none" strike="noStrike" kern="1200" cap="none" spc="0" normalizeH="0" baseline="0" noProof="0">
+              <a:ln>
+                <a:noFill/>
+              </a:ln>
+              <a:solidFill>
+                <a:prstClr val="black">
+                  <a:tint val="75000"/>
+                </a:prstClr>
+              </a:solidFill>
+              <a:effectLst/>
+              <a:uLnTx/>
+              <a:uFillTx/>
+              <a:latin typeface="Calibri"/>
+              <a:ea typeface="+mn-ea"/>
+              <a:cs typeface="+mn-cs"/>
+            </a:endParaRPr>
+          </a:p>
+        </p:txBody>
+      </p:sp>
+      <p:sp>
+        <p:nvSpPr>
+          <p:cNvPr id="4" name="Content Placeholder 2"/>
+          <p:cNvSpPr txBox="1">
+            <a:spLocks/>
+          </p:cNvSpPr>
+          <p:nvPr/>
+        </p:nvSpPr>
+        <p:spPr>
+          <a:xfrm>
+            <a:off x="76200" y="2275026"/>
+            <a:ext cx="8991600" cy="4506773"/>
+          </a:xfrm>
+          <a:prstGeom prst="rect">
+            <a:avLst/>
+          </a:prstGeom>
+        </p:spPr>
+        <p:txBody>
+          <a:bodyPr>
+            <a:normAutofit/>
+          </a:bodyPr>
+          <a:lstStyle>
+            <a:lvl1pPr marL="342900" indent="-342900" algn="l" defTabSz="914400" rtl="0" eaLnBrk="1" latinLnBrk="0" hangingPunct="1">
+              <a:spcBef>
+                <a:spcPct val="20000"/>
+              </a:spcBef>
+              <a:buFont typeface="Arial" pitchFamily="34" charset="0"/>
+              <a:buChar char="•"/>
+              <a:defRPr sz="3200" kern="1200">
+                <a:solidFill>
+                  <a:schemeClr val="tx1"/>
+                </a:solidFill>
+                <a:latin typeface="+mn-lt"/>
+                <a:ea typeface="+mn-ea"/>
+                <a:cs typeface="+mn-cs"/>
+              </a:defRPr>
+            </a:lvl1pPr>
+            <a:lvl2pPr marL="742950" indent="-285750" algn="l" defTabSz="914400" rtl="0" eaLnBrk="1" latinLnBrk="0" hangingPunct="1">
+              <a:spcBef>
+                <a:spcPct val="20000"/>
+              </a:spcBef>
+              <a:buFont typeface="Arial" pitchFamily="34" charset="0"/>
+              <a:buChar char="–"/>
+              <a:defRPr sz="2800" kern="1200">
+                <a:solidFill>
+                  <a:schemeClr val="tx1"/>
+                </a:solidFill>
+                <a:latin typeface="+mn-lt"/>
+                <a:ea typeface="+mn-ea"/>
+                <a:cs typeface="+mn-cs"/>
+              </a:defRPr>
+            </a:lvl2pPr>
+            <a:lvl3pPr marL="1143000" indent="-228600" algn="l" defTabSz="914400" rtl="0" eaLnBrk="1" latinLnBrk="0" hangingPunct="1">
+              <a:spcBef>
+                <a:spcPct val="20000"/>
+              </a:spcBef>
+              <a:buFont typeface="Arial" pitchFamily="34" charset="0"/>
+              <a:buChar char="•"/>
+              <a:defRPr sz="2400" kern="1200">
+                <a:solidFill>
+                  <a:schemeClr val="tx1"/>
+                </a:solidFill>
+                <a:latin typeface="+mn-lt"/>
+                <a:ea typeface="+mn-ea"/>
+                <a:cs typeface="+mn-cs"/>
+              </a:defRPr>
+            </a:lvl3pPr>
+            <a:lvl4pPr marL="1600200" indent="-228600" algn="l" defTabSz="914400" rtl="0" eaLnBrk="1" latinLnBrk="0" hangingPunct="1">
+              <a:spcBef>
+                <a:spcPct val="20000"/>
+              </a:spcBef>
+              <a:buFont typeface="Arial" pitchFamily="34" charset="0"/>
+              <a:buChar char="–"/>
+              <a:defRPr sz="2000" kern="1200">
+                <a:solidFill>
+                  <a:schemeClr val="tx1"/>
+                </a:solidFill>
+                <a:latin typeface="+mn-lt"/>
+                <a:ea typeface="+mn-ea"/>
+                <a:cs typeface="+mn-cs"/>
+              </a:defRPr>
+            </a:lvl4pPr>
+            <a:lvl5pPr marL="2057400" indent="-228600" algn="l" defTabSz="914400" rtl="0" eaLnBrk="1" latinLnBrk="0" hangingPunct="1">
+              <a:spcBef>
+                <a:spcPct val="20000"/>
+              </a:spcBef>
+              <a:buFont typeface="Arial" pitchFamily="34" charset="0"/>
+              <a:buChar char="»"/>
+              <a:defRPr sz="2000" kern="1200">
+                <a:solidFill>
+                  <a:schemeClr val="tx1"/>
+                </a:solidFill>
+                <a:latin typeface="+mn-lt"/>
+                <a:ea typeface="+mn-ea"/>
+                <a:cs typeface="+mn-cs"/>
+              </a:defRPr>
+            </a:lvl5pPr>
+            <a:lvl6pPr marL="2514600" indent="-228600" algn="l" defTabSz="914400" rtl="0" eaLnBrk="1" latinLnBrk="0" hangingPunct="1">
+              <a:spcBef>
+                <a:spcPct val="20000"/>
+              </a:spcBef>
+              <a:buFont typeface="Arial" pitchFamily="34" charset="0"/>
+              <a:buChar char="•"/>
+              <a:defRPr sz="2000" kern="1200">
+                <a:solidFill>
+                  <a:schemeClr val="tx1"/>
+                </a:solidFill>
+                <a:latin typeface="+mn-lt"/>
+                <a:ea typeface="+mn-ea"/>
+                <a:cs typeface="+mn-cs"/>
+              </a:defRPr>
+            </a:lvl6pPr>
+            <a:lvl7pPr marL="2971800" indent="-228600" algn="l" defTabSz="914400" rtl="0" eaLnBrk="1" latinLnBrk="0" hangingPunct="1">
+              <a:spcBef>
+                <a:spcPct val="20000"/>
+              </a:spcBef>
+              <a:buFont typeface="Arial" pitchFamily="34" charset="0"/>
+              <a:buChar char="•"/>
+              <a:defRPr sz="2000" kern="1200">
+                <a:solidFill>
+                  <a:schemeClr val="tx1"/>
+                </a:solidFill>
+                <a:latin typeface="+mn-lt"/>
+                <a:ea typeface="+mn-ea"/>
+                <a:cs typeface="+mn-cs"/>
+              </a:defRPr>
+            </a:lvl7pPr>
+            <a:lvl8pPr marL="3429000" indent="-228600" algn="l" defTabSz="914400" rtl="0" eaLnBrk="1" latinLnBrk="0" hangingPunct="1">
+              <a:spcBef>
+                <a:spcPct val="20000"/>
+              </a:spcBef>
+              <a:buFont typeface="Arial" pitchFamily="34" charset="0"/>
+              <a:buChar char="•"/>
+              <a:defRPr sz="2000" kern="1200">
+                <a:solidFill>
+                  <a:schemeClr val="tx1"/>
+                </a:solidFill>
+                <a:latin typeface="+mn-lt"/>
+                <a:ea typeface="+mn-ea"/>
+                <a:cs typeface="+mn-cs"/>
+              </a:defRPr>
+            </a:lvl8pPr>
+            <a:lvl9pPr marL="3886200" indent="-228600" algn="l" defTabSz="914400" rtl="0" eaLnBrk="1" latinLnBrk="0" hangingPunct="1">
+              <a:spcBef>
+                <a:spcPct val="20000"/>
+              </a:spcBef>
+              <a:buFont typeface="Arial" pitchFamily="34" charset="0"/>
+              <a:buChar char="•"/>
+              <a:defRPr sz="2000" kern="1200">
+                <a:solidFill>
+                  <a:schemeClr val="tx1"/>
+                </a:solidFill>
+                <a:latin typeface="+mn-lt"/>
+                <a:ea typeface="+mn-ea"/>
+                <a:cs typeface="+mn-cs"/>
+              </a:defRPr>
+            </a:lvl9pPr>
+          </a:lstStyle>
+          <a:p>
+            <a:pPr marL="514350" indent="-514350">
+              <a:buFont typeface="+mj-lt"/>
+              <a:buAutoNum type="arabicPeriod"/>
+            </a:pPr>
+            <a:r>
+              <a:rPr lang="en-US" dirty="0"/>
+              <a:t>Experimental plots</a:t>
+            </a:r>
+          </a:p>
+          <a:p>
+            <a:pPr marL="857250" lvl="1" indent="-457200"/>
+            <a:r>
+              <a:rPr lang="en-US" dirty="0"/>
+              <a:t>Often uses grid</a:t>
+            </a:r>
+          </a:p>
+          <a:p>
+            <a:pPr marL="514350" indent="-514350">
+              <a:buFont typeface="+mj-lt"/>
+              <a:buAutoNum type="arabicPeriod"/>
+            </a:pPr>
+            <a:r>
+              <a:rPr lang="en-US" dirty="0"/>
+              <a:t>Observational analysis</a:t>
+            </a:r>
+          </a:p>
+          <a:p>
+            <a:pPr marL="857250" lvl="1" indent="-457200"/>
+            <a:r>
+              <a:rPr lang="en-US" dirty="0"/>
+              <a:t>Fish surveys</a:t>
+            </a:r>
+          </a:p>
+        </p:txBody>
+      </p:sp>
+    </p:spTree>
+    <p:extLst>
+      <p:ext uri="{BB962C8B-B14F-4D97-AF65-F5344CB8AC3E}">
+        <p14:creationId xmlns:p14="http://schemas.microsoft.com/office/powerpoint/2010/main" val="2485759765"/>
+      </p:ext>
+    </p:extLst>
+  </p:cSld>
+  <p:clrMapOvr>
+    <a:masterClrMapping/>
+  </p:clrMapOvr>
+  <p:timing>
+    <p:tnLst>
+      <p:par>
+        <p:cTn id="1" dur="indefinite" restart="never" nodeType="tmRoot">
+          <p:childTnLst>
+            <p:seq concurrent="1" nextAc="seek">
+              <p:cTn id="2" dur="indefinite" nodeType="mainSeq">
+                <p:childTnLst>
+                  <p:par>
+                    <p:cTn id="3" fill="hold">
+                      <p:stCondLst>
+                        <p:cond delay="indefinite"/>
+                      </p:stCondLst>
+                      <p:childTnLst>
+                        <p:par>
+                          <p:cTn id="4" fill="hold">
+                            <p:stCondLst>
+                              <p:cond delay="0"/>
+                            </p:stCondLst>
+                            <p:childTnLst>
+                              <p:par>
+                                <p:cTn id="5" presetID="1" presetClass="entr" presetSubtype="0" fill="hold" nodeType="clickEffect">
+                                  <p:stCondLst>
+                                    <p:cond delay="0"/>
+                                  </p:stCondLst>
+                                  <p:childTnLst>
+                                    <p:set>
+                                      <p:cBhvr>
+                                        <p:cTn id="6" dur="1" fill="hold">
+                                          <p:stCondLst>
+                                            <p:cond delay="0"/>
+                                          </p:stCondLst>
+                                        </p:cTn>
+                                        <p:tgtEl>
+                                          <p:spTgt spid="4">
+                                            <p:txEl>
+                                              <p:pRg st="0" end="0"/>
+                                            </p:txEl>
+                                          </p:spTgt>
+                                        </p:tgtEl>
+                                        <p:attrNameLst>
+                                          <p:attrName>style.visibility</p:attrName>
+                                        </p:attrNameLst>
+                                      </p:cBhvr>
+                                      <p:to>
+                                        <p:strVal val="visible"/>
+                                      </p:to>
+                                    </p:set>
+                                  </p:childTnLst>
+                                </p:cTn>
+                              </p:par>
+                            </p:childTnLst>
+                          </p:cTn>
+                        </p:par>
+                      </p:childTnLst>
+                    </p:cTn>
+                  </p:par>
+                  <p:par>
+                    <p:cTn id="7" fill="hold">
+                      <p:stCondLst>
+                        <p:cond delay="indefinite"/>
+                      </p:stCondLst>
+                      <p:childTnLst>
+                        <p:par>
+                          <p:cTn id="8" fill="hold">
+                            <p:stCondLst>
+                              <p:cond delay="0"/>
+                            </p:stCondLst>
+                            <p:childTnLst>
+                              <p:par>
+                                <p:cTn id="9" presetID="1" presetClass="entr" presetSubtype="0" fill="hold" nodeType="clickEffect">
+                                  <p:stCondLst>
+                                    <p:cond delay="0"/>
+                                  </p:stCondLst>
+                                  <p:childTnLst>
+                                    <p:set>
+                                      <p:cBhvr>
+                                        <p:cTn id="10" dur="1" fill="hold">
+                                          <p:stCondLst>
+                                            <p:cond delay="0"/>
+                                          </p:stCondLst>
+                                        </p:cTn>
+                                        <p:tgtEl>
+                                          <p:spTgt spid="4">
+                                            <p:txEl>
+                                              <p:pRg st="1" end="1"/>
+                                            </p:txEl>
+                                          </p:spTgt>
+                                        </p:tgtEl>
+                                        <p:attrNameLst>
+                                          <p:attrName>style.visibility</p:attrName>
+                                        </p:attrNameLst>
+                                      </p:cBhvr>
+                                      <p:to>
+                                        <p:strVal val="visible"/>
+                                      </p:to>
+                                    </p:set>
+                                  </p:childTnLst>
+                                </p:cTn>
+                              </p:par>
+                            </p:childTnLst>
+                          </p:cTn>
+                        </p:par>
+                      </p:childTnLst>
+                    </p:cTn>
+                  </p:par>
+                  <p:par>
+                    <p:cTn id="11" fill="hold">
+                      <p:stCondLst>
+                        <p:cond delay="indefinite"/>
+                      </p:stCondLst>
+                      <p:childTnLst>
+                        <p:par>
+                          <p:cTn id="12" fill="hold">
+                            <p:stCondLst>
+                              <p:cond delay="0"/>
+                            </p:stCondLst>
+                            <p:childTnLst>
+                              <p:par>
+                                <p:cTn id="13" presetID="1" presetClass="entr" presetSubtype="0" fill="hold" nodeType="clickEffect">
+                                  <p:stCondLst>
+                                    <p:cond delay="0"/>
+                                  </p:stCondLst>
+                                  <p:childTnLst>
+                                    <p:set>
+                                      <p:cBhvr>
+                                        <p:cTn id="14" dur="1" fill="hold">
+                                          <p:stCondLst>
+                                            <p:cond delay="0"/>
+                                          </p:stCondLst>
+                                        </p:cTn>
+                                        <p:tgtEl>
+                                          <p:spTgt spid="4">
+                                            <p:txEl>
+                                              <p:pRg st="2" end="2"/>
+                                            </p:txEl>
+                                          </p:spTgt>
+                                        </p:tgtEl>
+                                        <p:attrNameLst>
+                                          <p:attrName>style.visibility</p:attrName>
+                                        </p:attrNameLst>
+                                      </p:cBhvr>
+                                      <p:to>
+                                        <p:strVal val="visible"/>
+                                      </p:to>
+                                    </p:set>
+                                  </p:childTnLst>
+                                </p:cTn>
+                              </p:par>
+                            </p:childTnLst>
+                          </p:cTn>
+                        </p:par>
+                      </p:childTnLst>
+                    </p:cTn>
+                  </p:par>
+                  <p:par>
+                    <p:cTn id="15" fill="hold">
+                      <p:stCondLst>
+                        <p:cond delay="indefinite"/>
+                      </p:stCondLst>
+                      <p:childTnLst>
+                        <p:par>
+                          <p:cTn id="16" fill="hold">
+                            <p:stCondLst>
+                              <p:cond delay="0"/>
+                            </p:stCondLst>
+                            <p:childTnLst>
+                              <p:par>
+                                <p:cTn id="17" presetID="1" presetClass="entr" presetSubtype="0" fill="hold" nodeType="clickEffect">
+                                  <p:stCondLst>
+                                    <p:cond delay="0"/>
+                                  </p:stCondLst>
+                                  <p:childTnLst>
+                                    <p:set>
+                                      <p:cBhvr>
+                                        <p:cTn id="18" dur="1" fill="hold">
+                                          <p:stCondLst>
+                                            <p:cond delay="0"/>
+                                          </p:stCondLst>
+                                        </p:cTn>
+                                        <p:tgtEl>
+                                          <p:spTgt spid="4">
+                                            <p:txEl>
+                                              <p:pRg st="3" end="3"/>
+                                            </p:txEl>
+                                          </p:spTgt>
+                                        </p:tgtEl>
+                                        <p:attrNameLst>
+                                          <p:attrName>style.visibility</p:attrName>
+                                        </p:attrNameLst>
+                                      </p:cBhvr>
+                                      <p:to>
+                                        <p:strVal val="visible"/>
+                                      </p:to>
+                                    </p:set>
+                                  </p:childTnLst>
+                                </p:cTn>
+                              </p:par>
+                            </p:childTnLst>
+                          </p:cTn>
+                        </p:par>
+                      </p:childTnLst>
+                    </p:cTn>
+                  </p:par>
+                </p:childTnLst>
+              </p:cTn>
+              <p:prevCondLst>
+                <p:cond evt="onPrev" delay="0">
+                  <p:tgtEl>
+                    <p:sldTgt/>
+                  </p:tgtEl>
+                </p:cond>
+              </p:prevCondLst>
+              <p:nextCondLst>
+                <p:cond evt="onNext" delay="0">
+                  <p:tgtEl>
+                    <p:sldTgt/>
+                  </p:tgtEl>
+                </p:cond>
+              </p:nextCondLst>
+            </p:seq>
+          </p:childTnLst>
+        </p:cTn>
+      </p:par>
+    </p:tnLst>
+  </p:timing>
+</p:sld>
+</file>
+
+<file path=ppt/slides/slide20.xml><?xml version="1.0" encoding="utf-8"?>
 <p:sld xmlns:a="http://schemas.openxmlformats.org/drawingml/2006/main" xmlns:r="http://schemas.openxmlformats.org/officeDocument/2006/relationships" xmlns:p="http://schemas.openxmlformats.org/presentationml/2006/main">
   <p:cSld>
     <p:spTree>
@@ -11812,7 +13373,7 @@
 </p:sld>
 </file>
 
-<file path=ppt/slides/slide19.xml><?xml version="1.0" encoding="utf-8"?>
+<file path=ppt/slides/slide21.xml><?xml version="1.0" encoding="utf-8"?>
 <p:sld xmlns:a="http://schemas.openxmlformats.org/drawingml/2006/main" xmlns:r="http://schemas.openxmlformats.org/officeDocument/2006/relationships" xmlns:p="http://schemas.openxmlformats.org/presentationml/2006/main">
   <p:cSld>
     <p:spTree>
@@ -12158,568 +13719,7 @@
 </p:sld>
 </file>
 
-<file path=ppt/slides/slide2.xml><?xml version="1.0" encoding="utf-8"?>
-<p:sld xmlns:a="http://schemas.openxmlformats.org/drawingml/2006/main" xmlns:r="http://schemas.openxmlformats.org/officeDocument/2006/relationships" xmlns:p="http://schemas.openxmlformats.org/presentationml/2006/main">
-  <p:cSld>
-    <p:spTree>
-      <p:nvGrpSpPr>
-        <p:cNvPr id="1" name=""/>
-        <p:cNvGrpSpPr/>
-        <p:nvPr/>
-      </p:nvGrpSpPr>
-      <p:grpSpPr>
-        <a:xfrm>
-          <a:off x="0" y="0"/>
-          <a:ext cx="0" cy="0"/>
-          <a:chOff x="0" y="0"/>
-          <a:chExt cx="0" cy="0"/>
-        </a:xfrm>
-      </p:grpSpPr>
-      <p:sp>
-        <p:nvSpPr>
-          <p:cNvPr id="2" name="Title 1"/>
-          <p:cNvSpPr>
-            <a:spLocks noGrp="1"/>
-          </p:cNvSpPr>
-          <p:nvPr>
-            <p:ph type="title"/>
-          </p:nvPr>
-        </p:nvSpPr>
-        <p:spPr/>
-        <p:txBody>
-          <a:bodyPr>
-            <a:normAutofit fontScale="90000"/>
-          </a:bodyPr>
-          <a:lstStyle/>
-          <a:p>
-            <a:r>
-              <a:rPr lang="en-US" dirty="0"/>
-              <a:t>Why might we care about 2D spatial models?</a:t>
-            </a:r>
-          </a:p>
-        </p:txBody>
-      </p:sp>
-      <p:sp>
-        <p:nvSpPr>
-          <p:cNvPr id="3" name="Slide Number Placeholder 2"/>
-          <p:cNvSpPr>
-            <a:spLocks noGrp="1"/>
-          </p:cNvSpPr>
-          <p:nvPr>
-            <p:ph type="sldNum" sz="quarter" idx="12"/>
-          </p:nvPr>
-        </p:nvSpPr>
-        <p:spPr/>
-        <p:txBody>
-          <a:bodyPr/>
-          <a:lstStyle/>
-          <a:p>
-            <a:pPr marL="0" marR="0" lvl="0" indent="0" algn="r" defTabSz="914400" rtl="0" eaLnBrk="1" fontAlgn="auto" latinLnBrk="0" hangingPunct="1">
-              <a:lnSpc>
-                <a:spcPct val="100000"/>
-              </a:lnSpc>
-              <a:spcBef>
-                <a:spcPts val="0"/>
-              </a:spcBef>
-              <a:spcAft>
-                <a:spcPts val="0"/>
-              </a:spcAft>
-              <a:buClrTx/>
-              <a:buSzTx/>
-              <a:buFontTx/>
-              <a:buNone/>
-              <a:tabLst/>
-              <a:defRPr/>
-            </a:pPr>
-            <a:fld id="{E0FF4530-C0A9-489F-AD78-78B1E4B1E710}" type="slidenum">
-              <a:rPr kumimoji="0" lang="en-US" sz="1200" b="0" i="0" u="none" strike="noStrike" kern="1200" cap="none" spc="0" normalizeH="0" baseline="0" noProof="0" smtClean="0">
-                <a:ln>
-                  <a:noFill/>
-                </a:ln>
-                <a:solidFill>
-                  <a:prstClr val="black">
-                    <a:tint val="75000"/>
-                  </a:prstClr>
-                </a:solidFill>
-                <a:effectLst/>
-                <a:uLnTx/>
-                <a:uFillTx/>
-                <a:latin typeface="Calibri"/>
-                <a:ea typeface="+mn-ea"/>
-                <a:cs typeface="+mn-cs"/>
-              </a:rPr>
-              <a:pPr marL="0" marR="0" lvl="0" indent="0" algn="r" defTabSz="914400" rtl="0" eaLnBrk="1" fontAlgn="auto" latinLnBrk="0" hangingPunct="1">
-                <a:lnSpc>
-                  <a:spcPct val="100000"/>
-                </a:lnSpc>
-                <a:spcBef>
-                  <a:spcPts val="0"/>
-                </a:spcBef>
-                <a:spcAft>
-                  <a:spcPts val="0"/>
-                </a:spcAft>
-                <a:buClrTx/>
-                <a:buSzTx/>
-                <a:buFontTx/>
-                <a:buNone/>
-                <a:tabLst/>
-                <a:defRPr/>
-              </a:pPr>
-              <a:t>2</a:t>
-            </a:fld>
-            <a:endParaRPr kumimoji="0" lang="en-US" sz="1200" b="0" i="0" u="none" strike="noStrike" kern="1200" cap="none" spc="0" normalizeH="0" baseline="0" noProof="0">
-              <a:ln>
-                <a:noFill/>
-              </a:ln>
-              <a:solidFill>
-                <a:prstClr val="black">
-                  <a:tint val="75000"/>
-                </a:prstClr>
-              </a:solidFill>
-              <a:effectLst/>
-              <a:uLnTx/>
-              <a:uFillTx/>
-              <a:latin typeface="Calibri"/>
-              <a:ea typeface="+mn-ea"/>
-              <a:cs typeface="+mn-cs"/>
-            </a:endParaRPr>
-          </a:p>
-        </p:txBody>
-      </p:sp>
-      <p:sp>
-        <p:nvSpPr>
-          <p:cNvPr id="4" name="Content Placeholder 2"/>
-          <p:cNvSpPr txBox="1">
-            <a:spLocks/>
-          </p:cNvSpPr>
-          <p:nvPr/>
-        </p:nvSpPr>
-        <p:spPr>
-          <a:xfrm>
-            <a:off x="76200" y="2275026"/>
-            <a:ext cx="8991600" cy="4506773"/>
-          </a:xfrm>
-          <a:prstGeom prst="rect">
-            <a:avLst/>
-          </a:prstGeom>
-        </p:spPr>
-        <p:txBody>
-          <a:bodyPr>
-            <a:normAutofit/>
-          </a:bodyPr>
-          <a:lstStyle>
-            <a:lvl1pPr marL="342900" indent="-342900" algn="l" defTabSz="914400" rtl="0" eaLnBrk="1" latinLnBrk="0" hangingPunct="1">
-              <a:spcBef>
-                <a:spcPct val="20000"/>
-              </a:spcBef>
-              <a:buFont typeface="Arial" pitchFamily="34" charset="0"/>
-              <a:buChar char="•"/>
-              <a:defRPr sz="3200" kern="1200">
-                <a:solidFill>
-                  <a:schemeClr val="tx1"/>
-                </a:solidFill>
-                <a:latin typeface="+mn-lt"/>
-                <a:ea typeface="+mn-ea"/>
-                <a:cs typeface="+mn-cs"/>
-              </a:defRPr>
-            </a:lvl1pPr>
-            <a:lvl2pPr marL="742950" indent="-285750" algn="l" defTabSz="914400" rtl="0" eaLnBrk="1" latinLnBrk="0" hangingPunct="1">
-              <a:spcBef>
-                <a:spcPct val="20000"/>
-              </a:spcBef>
-              <a:buFont typeface="Arial" pitchFamily="34" charset="0"/>
-              <a:buChar char="–"/>
-              <a:defRPr sz="2800" kern="1200">
-                <a:solidFill>
-                  <a:schemeClr val="tx1"/>
-                </a:solidFill>
-                <a:latin typeface="+mn-lt"/>
-                <a:ea typeface="+mn-ea"/>
-                <a:cs typeface="+mn-cs"/>
-              </a:defRPr>
-            </a:lvl2pPr>
-            <a:lvl3pPr marL="1143000" indent="-228600" algn="l" defTabSz="914400" rtl="0" eaLnBrk="1" latinLnBrk="0" hangingPunct="1">
-              <a:spcBef>
-                <a:spcPct val="20000"/>
-              </a:spcBef>
-              <a:buFont typeface="Arial" pitchFamily="34" charset="0"/>
-              <a:buChar char="•"/>
-              <a:defRPr sz="2400" kern="1200">
-                <a:solidFill>
-                  <a:schemeClr val="tx1"/>
-                </a:solidFill>
-                <a:latin typeface="+mn-lt"/>
-                <a:ea typeface="+mn-ea"/>
-                <a:cs typeface="+mn-cs"/>
-              </a:defRPr>
-            </a:lvl3pPr>
-            <a:lvl4pPr marL="1600200" indent="-228600" algn="l" defTabSz="914400" rtl="0" eaLnBrk="1" latinLnBrk="0" hangingPunct="1">
-              <a:spcBef>
-                <a:spcPct val="20000"/>
-              </a:spcBef>
-              <a:buFont typeface="Arial" pitchFamily="34" charset="0"/>
-              <a:buChar char="–"/>
-              <a:defRPr sz="2000" kern="1200">
-                <a:solidFill>
-                  <a:schemeClr val="tx1"/>
-                </a:solidFill>
-                <a:latin typeface="+mn-lt"/>
-                <a:ea typeface="+mn-ea"/>
-                <a:cs typeface="+mn-cs"/>
-              </a:defRPr>
-            </a:lvl4pPr>
-            <a:lvl5pPr marL="2057400" indent="-228600" algn="l" defTabSz="914400" rtl="0" eaLnBrk="1" latinLnBrk="0" hangingPunct="1">
-              <a:spcBef>
-                <a:spcPct val="20000"/>
-              </a:spcBef>
-              <a:buFont typeface="Arial" pitchFamily="34" charset="0"/>
-              <a:buChar char="»"/>
-              <a:defRPr sz="2000" kern="1200">
-                <a:solidFill>
-                  <a:schemeClr val="tx1"/>
-                </a:solidFill>
-                <a:latin typeface="+mn-lt"/>
-                <a:ea typeface="+mn-ea"/>
-                <a:cs typeface="+mn-cs"/>
-              </a:defRPr>
-            </a:lvl5pPr>
-            <a:lvl6pPr marL="2514600" indent="-228600" algn="l" defTabSz="914400" rtl="0" eaLnBrk="1" latinLnBrk="0" hangingPunct="1">
-              <a:spcBef>
-                <a:spcPct val="20000"/>
-              </a:spcBef>
-              <a:buFont typeface="Arial" pitchFamily="34" charset="0"/>
-              <a:buChar char="•"/>
-              <a:defRPr sz="2000" kern="1200">
-                <a:solidFill>
-                  <a:schemeClr val="tx1"/>
-                </a:solidFill>
-                <a:latin typeface="+mn-lt"/>
-                <a:ea typeface="+mn-ea"/>
-                <a:cs typeface="+mn-cs"/>
-              </a:defRPr>
-            </a:lvl6pPr>
-            <a:lvl7pPr marL="2971800" indent="-228600" algn="l" defTabSz="914400" rtl="0" eaLnBrk="1" latinLnBrk="0" hangingPunct="1">
-              <a:spcBef>
-                <a:spcPct val="20000"/>
-              </a:spcBef>
-              <a:buFont typeface="Arial" pitchFamily="34" charset="0"/>
-              <a:buChar char="•"/>
-              <a:defRPr sz="2000" kern="1200">
-                <a:solidFill>
-                  <a:schemeClr val="tx1"/>
-                </a:solidFill>
-                <a:latin typeface="+mn-lt"/>
-                <a:ea typeface="+mn-ea"/>
-                <a:cs typeface="+mn-cs"/>
-              </a:defRPr>
-            </a:lvl7pPr>
-            <a:lvl8pPr marL="3429000" indent="-228600" algn="l" defTabSz="914400" rtl="0" eaLnBrk="1" latinLnBrk="0" hangingPunct="1">
-              <a:spcBef>
-                <a:spcPct val="20000"/>
-              </a:spcBef>
-              <a:buFont typeface="Arial" pitchFamily="34" charset="0"/>
-              <a:buChar char="•"/>
-              <a:defRPr sz="2000" kern="1200">
-                <a:solidFill>
-                  <a:schemeClr val="tx1"/>
-                </a:solidFill>
-                <a:latin typeface="+mn-lt"/>
-                <a:ea typeface="+mn-ea"/>
-                <a:cs typeface="+mn-cs"/>
-              </a:defRPr>
-            </a:lvl8pPr>
-            <a:lvl9pPr marL="3886200" indent="-228600" algn="l" defTabSz="914400" rtl="0" eaLnBrk="1" latinLnBrk="0" hangingPunct="1">
-              <a:spcBef>
-                <a:spcPct val="20000"/>
-              </a:spcBef>
-              <a:buFont typeface="Arial" pitchFamily="34" charset="0"/>
-              <a:buChar char="•"/>
-              <a:defRPr sz="2000" kern="1200">
-                <a:solidFill>
-                  <a:schemeClr val="tx1"/>
-                </a:solidFill>
-                <a:latin typeface="+mn-lt"/>
-                <a:ea typeface="+mn-ea"/>
-                <a:cs typeface="+mn-cs"/>
-              </a:defRPr>
-            </a:lvl9pPr>
-          </a:lstStyle>
-          <a:p>
-            <a:pPr marL="514350" indent="-514350">
-              <a:buFont typeface="+mj-lt"/>
-              <a:buAutoNum type="arabicPeriod"/>
-            </a:pPr>
-            <a:r>
-              <a:rPr lang="en-US" dirty="0"/>
-              <a:t>Experimental plots</a:t>
-            </a:r>
-          </a:p>
-          <a:p>
-            <a:pPr marL="857250" lvl="1" indent="-457200"/>
-            <a:r>
-              <a:rPr lang="en-US" dirty="0"/>
-              <a:t>Often uses grid</a:t>
-            </a:r>
-          </a:p>
-          <a:p>
-            <a:pPr marL="514350" indent="-514350">
-              <a:buFont typeface="+mj-lt"/>
-              <a:buAutoNum type="arabicPeriod"/>
-            </a:pPr>
-            <a:r>
-              <a:rPr lang="en-US" dirty="0"/>
-              <a:t>Observational analysis</a:t>
-            </a:r>
-          </a:p>
-          <a:p>
-            <a:pPr marL="857250" lvl="1" indent="-457200"/>
-            <a:r>
-              <a:rPr lang="en-US" dirty="0"/>
-              <a:t>Fish surveys</a:t>
-            </a:r>
-          </a:p>
-        </p:txBody>
-      </p:sp>
-    </p:spTree>
-    <p:extLst>
-      <p:ext uri="{BB962C8B-B14F-4D97-AF65-F5344CB8AC3E}">
-        <p14:creationId xmlns:p14="http://schemas.microsoft.com/office/powerpoint/2010/main" val="2485759765"/>
-      </p:ext>
-    </p:extLst>
-  </p:cSld>
-  <p:clrMapOvr>
-    <a:masterClrMapping/>
-  </p:clrMapOvr>
-  <p:timing>
-    <p:tnLst>
-      <p:par>
-        <p:cTn id="1" dur="indefinite" restart="never" nodeType="tmRoot">
-          <p:childTnLst>
-            <p:seq concurrent="1" nextAc="seek">
-              <p:cTn id="2" dur="indefinite" nodeType="mainSeq">
-                <p:childTnLst>
-                  <p:par>
-                    <p:cTn id="3" fill="hold">
-                      <p:stCondLst>
-                        <p:cond delay="indefinite"/>
-                      </p:stCondLst>
-                      <p:childTnLst>
-                        <p:par>
-                          <p:cTn id="4" fill="hold">
-                            <p:stCondLst>
-                              <p:cond delay="0"/>
-                            </p:stCondLst>
-                            <p:childTnLst>
-                              <p:par>
-                                <p:cTn id="5" presetID="1" presetClass="entr" presetSubtype="0" fill="hold" nodeType="clickEffect">
-                                  <p:stCondLst>
-                                    <p:cond delay="0"/>
-                                  </p:stCondLst>
-                                  <p:childTnLst>
-                                    <p:set>
-                                      <p:cBhvr>
-                                        <p:cTn id="6" dur="1" fill="hold">
-                                          <p:stCondLst>
-                                            <p:cond delay="0"/>
-                                          </p:stCondLst>
-                                        </p:cTn>
-                                        <p:tgtEl>
-                                          <p:spTgt spid="4">
-                                            <p:txEl>
-                                              <p:pRg st="0" end="0"/>
-                                            </p:txEl>
-                                          </p:spTgt>
-                                        </p:tgtEl>
-                                        <p:attrNameLst>
-                                          <p:attrName>style.visibility</p:attrName>
-                                        </p:attrNameLst>
-                                      </p:cBhvr>
-                                      <p:to>
-                                        <p:strVal val="visible"/>
-                                      </p:to>
-                                    </p:set>
-                                  </p:childTnLst>
-                                </p:cTn>
-                              </p:par>
-                            </p:childTnLst>
-                          </p:cTn>
-                        </p:par>
-                      </p:childTnLst>
-                    </p:cTn>
-                  </p:par>
-                  <p:par>
-                    <p:cTn id="7" fill="hold">
-                      <p:stCondLst>
-                        <p:cond delay="indefinite"/>
-                      </p:stCondLst>
-                      <p:childTnLst>
-                        <p:par>
-                          <p:cTn id="8" fill="hold">
-                            <p:stCondLst>
-                              <p:cond delay="0"/>
-                            </p:stCondLst>
-                            <p:childTnLst>
-                              <p:par>
-                                <p:cTn id="9" presetID="1" presetClass="entr" presetSubtype="0" fill="hold" nodeType="clickEffect">
-                                  <p:stCondLst>
-                                    <p:cond delay="0"/>
-                                  </p:stCondLst>
-                                  <p:childTnLst>
-                                    <p:set>
-                                      <p:cBhvr>
-                                        <p:cTn id="10" dur="1" fill="hold">
-                                          <p:stCondLst>
-                                            <p:cond delay="0"/>
-                                          </p:stCondLst>
-                                        </p:cTn>
-                                        <p:tgtEl>
-                                          <p:spTgt spid="4">
-                                            <p:txEl>
-                                              <p:pRg st="1" end="1"/>
-                                            </p:txEl>
-                                          </p:spTgt>
-                                        </p:tgtEl>
-                                        <p:attrNameLst>
-                                          <p:attrName>style.visibility</p:attrName>
-                                        </p:attrNameLst>
-                                      </p:cBhvr>
-                                      <p:to>
-                                        <p:strVal val="visible"/>
-                                      </p:to>
-                                    </p:set>
-                                  </p:childTnLst>
-                                </p:cTn>
-                              </p:par>
-                            </p:childTnLst>
-                          </p:cTn>
-                        </p:par>
-                      </p:childTnLst>
-                    </p:cTn>
-                  </p:par>
-                  <p:par>
-                    <p:cTn id="11" fill="hold">
-                      <p:stCondLst>
-                        <p:cond delay="indefinite"/>
-                      </p:stCondLst>
-                      <p:childTnLst>
-                        <p:par>
-                          <p:cTn id="12" fill="hold">
-                            <p:stCondLst>
-                              <p:cond delay="0"/>
-                            </p:stCondLst>
-                            <p:childTnLst>
-                              <p:par>
-                                <p:cTn id="13" presetID="1" presetClass="entr" presetSubtype="0" fill="hold" nodeType="clickEffect">
-                                  <p:stCondLst>
-                                    <p:cond delay="0"/>
-                                  </p:stCondLst>
-                                  <p:childTnLst>
-                                    <p:set>
-                                      <p:cBhvr>
-                                        <p:cTn id="14" dur="1" fill="hold">
-                                          <p:stCondLst>
-                                            <p:cond delay="0"/>
-                                          </p:stCondLst>
-                                        </p:cTn>
-                                        <p:tgtEl>
-                                          <p:spTgt spid="4">
-                                            <p:txEl>
-                                              <p:pRg st="2" end="2"/>
-                                            </p:txEl>
-                                          </p:spTgt>
-                                        </p:tgtEl>
-                                        <p:attrNameLst>
-                                          <p:attrName>style.visibility</p:attrName>
-                                        </p:attrNameLst>
-                                      </p:cBhvr>
-                                      <p:to>
-                                        <p:strVal val="visible"/>
-                                      </p:to>
-                                    </p:set>
-                                  </p:childTnLst>
-                                </p:cTn>
-                              </p:par>
-                            </p:childTnLst>
-                          </p:cTn>
-                        </p:par>
-                      </p:childTnLst>
-                    </p:cTn>
-                  </p:par>
-                  <p:par>
-                    <p:cTn id="15" fill="hold">
-                      <p:stCondLst>
-                        <p:cond delay="indefinite"/>
-                      </p:stCondLst>
-                      <p:childTnLst>
-                        <p:par>
-                          <p:cTn id="16" fill="hold">
-                            <p:stCondLst>
-                              <p:cond delay="0"/>
-                            </p:stCondLst>
-                            <p:childTnLst>
-                              <p:par>
-                                <p:cTn id="17" presetID="1" presetClass="entr" presetSubtype="0" fill="hold" nodeType="clickEffect">
-                                  <p:stCondLst>
-                                    <p:cond delay="0"/>
-                                  </p:stCondLst>
-                                  <p:childTnLst>
-                                    <p:set>
-                                      <p:cBhvr>
-                                        <p:cTn id="18" dur="1" fill="hold">
-                                          <p:stCondLst>
-                                            <p:cond delay="0"/>
-                                          </p:stCondLst>
-                                        </p:cTn>
-                                        <p:tgtEl>
-                                          <p:spTgt spid="4">
-                                            <p:txEl>
-                                              <p:pRg st="3" end="3"/>
-                                            </p:txEl>
-                                          </p:spTgt>
-                                        </p:tgtEl>
-                                        <p:attrNameLst>
-                                          <p:attrName>style.visibility</p:attrName>
-                                        </p:attrNameLst>
-                                      </p:cBhvr>
-                                      <p:to>
-                                        <p:strVal val="visible"/>
-                                      </p:to>
-                                    </p:set>
-                                  </p:childTnLst>
-                                </p:cTn>
-                              </p:par>
-                            </p:childTnLst>
-                          </p:cTn>
-                        </p:par>
-                      </p:childTnLst>
-                    </p:cTn>
-                  </p:par>
-                </p:childTnLst>
-              </p:cTn>
-              <p:prevCondLst>
-                <p:cond evt="onPrev" delay="0">
-                  <p:tgtEl>
-                    <p:sldTgt/>
-                  </p:tgtEl>
-                </p:cond>
-              </p:prevCondLst>
-              <p:nextCondLst>
-                <p:cond evt="onNext" delay="0">
-                  <p:tgtEl>
-                    <p:sldTgt/>
-                  </p:tgtEl>
-                </p:cond>
-              </p:nextCondLst>
-            </p:seq>
-          </p:childTnLst>
-        </p:cTn>
-      </p:par>
-    </p:tnLst>
-  </p:timing>
-</p:sld>
-</file>
-
-<file path=ppt/slides/slide20.xml><?xml version="1.0" encoding="utf-8"?>
+<file path=ppt/slides/slide22.xml><?xml version="1.0" encoding="utf-8"?>
 <p:sld xmlns:a="http://schemas.openxmlformats.org/drawingml/2006/main" xmlns:r="http://schemas.openxmlformats.org/officeDocument/2006/relationships" xmlns:p="http://schemas.openxmlformats.org/presentationml/2006/main">
   <p:cSld>
     <p:spTree>
@@ -12755,8 +13755,8 @@
           </a:p>
         </p:txBody>
       </p:sp>
-      <mc:AlternateContent xmlns:mc="http://schemas.openxmlformats.org/markup-compatibility/2006">
-        <mc:Choice xmlns:a14="http://schemas.microsoft.com/office/drawing/2010/main" Requires="a14">
+      <mc:AlternateContent xmlns:mc="http://schemas.openxmlformats.org/markup-compatibility/2006" xmlns:a14="http://schemas.microsoft.com/office/drawing/2010/main">
+        <mc:Choice Requires="a14">
           <p:sp>
             <p:nvSpPr>
               <p:cNvPr id="3" name="Content Placeholder 2"/>
@@ -12903,7 +13903,7 @@
             </p:txBody>
           </p:sp>
         </mc:Choice>
-        <mc:Fallback>
+        <mc:Fallback xmlns="">
           <p:sp>
             <p:nvSpPr>
               <p:cNvPr id="3" name="Content Placeholder 2"/>
@@ -12950,7 +13950,7 @@
 </p:sld>
 </file>
 
-<file path=ppt/slides/slide21.xml><?xml version="1.0" encoding="utf-8"?>
+<file path=ppt/slides/slide23.xml><?xml version="1.0" encoding="utf-8"?>
 <p:sld xmlns:a="http://schemas.openxmlformats.org/drawingml/2006/main" xmlns:r="http://schemas.openxmlformats.org/officeDocument/2006/relationships" xmlns:p="http://schemas.openxmlformats.org/presentationml/2006/main">
   <p:cSld>
     <p:spTree>
@@ -14394,8 +15394,8 @@
           </a:p>
         </p:txBody>
       </p:sp>
-      <mc:AlternateContent xmlns:mc="http://schemas.openxmlformats.org/markup-compatibility/2006">
-        <mc:Choice xmlns:a14="http://schemas.microsoft.com/office/drawing/2010/main" Requires="a14">
+      <mc:AlternateContent xmlns:mc="http://schemas.openxmlformats.org/markup-compatibility/2006" xmlns:a14="http://schemas.microsoft.com/office/drawing/2010/main">
+        <mc:Choice Requires="a14">
           <p:sp>
             <p:nvSpPr>
               <p:cNvPr id="3" name="Content Placeholder 2"/>
@@ -14891,7 +15891,7 @@
             </p:txBody>
           </p:sp>
         </mc:Choice>
-        <mc:Fallback>
+        <mc:Fallback xmlns="">
           <p:sp>
             <p:nvSpPr>
               <p:cNvPr id="3" name="Content Placeholder 2"/>
@@ -14925,8 +15925,8 @@
           </p:sp>
         </mc:Fallback>
       </mc:AlternateContent>
-      <mc:AlternateContent xmlns:mc="http://schemas.openxmlformats.org/markup-compatibility/2006">
-        <mc:Choice xmlns:a14="http://schemas.microsoft.com/office/drawing/2010/main" Requires="a14">
+      <mc:AlternateContent xmlns:mc="http://schemas.openxmlformats.org/markup-compatibility/2006" xmlns:a14="http://schemas.microsoft.com/office/drawing/2010/main">
+        <mc:Choice Requires="a14">
           <p:graphicFrame>
             <p:nvGraphicFramePr>
               <p:cNvPr id="9" name="Table 8">
@@ -15012,6 +16012,7 @@
                         <a:bodyPr/>
                         <a:lstStyle/>
                         <a:p>
+                          <a:pPr/>
                           <a14:m>
                             <m:oMathPara xmlns:m="http://schemas.openxmlformats.org/officeDocument/2006/math">
                               <m:oMathParaPr>
@@ -15126,6 +16127,7 @@
                         <a:bodyPr/>
                         <a:lstStyle/>
                         <a:p>
+                          <a:pPr/>
                           <a14:m>
                             <m:oMathPara xmlns:m="http://schemas.openxmlformats.org/officeDocument/2006/math">
                               <m:oMathParaPr>
@@ -15297,6 +16299,7 @@
                         <a:bodyPr/>
                         <a:lstStyle/>
                         <a:p>
+                          <a:pPr/>
                           <a14:m>
                             <m:oMathPara xmlns:m="http://schemas.openxmlformats.org/officeDocument/2006/math">
                               <m:oMathParaPr>
@@ -15477,6 +16480,7 @@
                         <a:bodyPr/>
                         <a:lstStyle/>
                         <a:p>
+                          <a:pPr/>
                           <a14:m>
                             <m:oMathPara xmlns:m="http://schemas.openxmlformats.org/officeDocument/2006/math">
                               <m:oMathParaPr>
@@ -15773,7 +16777,7 @@
             </a:graphic>
           </p:graphicFrame>
         </mc:Choice>
-        <mc:Fallback>
+        <mc:Fallback xmlns="">
           <p:graphicFrame>
             <p:nvGraphicFramePr>
               <p:cNvPr id="9" name="Table 8">

</xml_diff>